<commit_message>
Completed mid term Presentation
</commit_message>
<xml_diff>
--- a/DND Live Image Generator.pptx
+++ b/DND Live Image Generator.pptx
@@ -8,6 +8,8 @@
     <p:sldId id="256" r:id="rId2"/>
     <p:sldId id="257" r:id="rId3"/>
     <p:sldId id="258" r:id="rId4"/>
+    <p:sldId id="260" r:id="rId5"/>
+    <p:sldId id="261" r:id="rId6"/>
   </p:sldIdLst>
   <p:sldSz cx="12192000" cy="6858000"/>
   <p:notesSz cx="6858000" cy="9144000"/>
@@ -106,6 +108,11 @@
       </a:defRPr>
     </a:lvl9pPr>
   </p:defaultTextStyle>
+  <p:extLst>
+    <p:ext uri="{EFAFB233-063F-42B5-8137-9DF3F51BA10A}">
+      <p15:sldGuideLst xmlns:p15="http://schemas.microsoft.com/office/powerpoint/2012/main"/>
+    </p:ext>
+  </p:extLst>
 </p:presentation>
 </file>
 
@@ -258,7 +265,7 @@
           <a:p>
             <a:fld id="{0746787B-11D1-4B91-96FD-DAFF62956ADE}" type="datetimeFigureOut">
               <a:rPr lang="de-CH" smtClean="0"/>
-              <a:t>07.11.2024</a:t>
+              <a:t>08.11.2024</a:t>
             </a:fld>
             <a:endParaRPr lang="de-CH"/>
           </a:p>
@@ -458,7 +465,7 @@
           <a:p>
             <a:fld id="{0746787B-11D1-4B91-96FD-DAFF62956ADE}" type="datetimeFigureOut">
               <a:rPr lang="de-CH" smtClean="0"/>
-              <a:t>07.11.2024</a:t>
+              <a:t>08.11.2024</a:t>
             </a:fld>
             <a:endParaRPr lang="de-CH"/>
           </a:p>
@@ -668,7 +675,7 @@
           <a:p>
             <a:fld id="{0746787B-11D1-4B91-96FD-DAFF62956ADE}" type="datetimeFigureOut">
               <a:rPr lang="de-CH" smtClean="0"/>
-              <a:t>07.11.2024</a:t>
+              <a:t>08.11.2024</a:t>
             </a:fld>
             <a:endParaRPr lang="de-CH"/>
           </a:p>
@@ -868,7 +875,7 @@
           <a:p>
             <a:fld id="{0746787B-11D1-4B91-96FD-DAFF62956ADE}" type="datetimeFigureOut">
               <a:rPr lang="de-CH" smtClean="0"/>
-              <a:t>07.11.2024</a:t>
+              <a:t>08.11.2024</a:t>
             </a:fld>
             <a:endParaRPr lang="de-CH"/>
           </a:p>
@@ -1144,7 +1151,7 @@
           <a:p>
             <a:fld id="{0746787B-11D1-4B91-96FD-DAFF62956ADE}" type="datetimeFigureOut">
               <a:rPr lang="de-CH" smtClean="0"/>
-              <a:t>07.11.2024</a:t>
+              <a:t>08.11.2024</a:t>
             </a:fld>
             <a:endParaRPr lang="de-CH"/>
           </a:p>
@@ -1412,7 +1419,7 @@
           <a:p>
             <a:fld id="{0746787B-11D1-4B91-96FD-DAFF62956ADE}" type="datetimeFigureOut">
               <a:rPr lang="de-CH" smtClean="0"/>
-              <a:t>07.11.2024</a:t>
+              <a:t>08.11.2024</a:t>
             </a:fld>
             <a:endParaRPr lang="de-CH"/>
           </a:p>
@@ -1827,7 +1834,7 @@
           <a:p>
             <a:fld id="{0746787B-11D1-4B91-96FD-DAFF62956ADE}" type="datetimeFigureOut">
               <a:rPr lang="de-CH" smtClean="0"/>
-              <a:t>07.11.2024</a:t>
+              <a:t>08.11.2024</a:t>
             </a:fld>
             <a:endParaRPr lang="de-CH"/>
           </a:p>
@@ -1969,7 +1976,7 @@
           <a:p>
             <a:fld id="{0746787B-11D1-4B91-96FD-DAFF62956ADE}" type="datetimeFigureOut">
               <a:rPr lang="de-CH" smtClean="0"/>
-              <a:t>07.11.2024</a:t>
+              <a:t>08.11.2024</a:t>
             </a:fld>
             <a:endParaRPr lang="de-CH"/>
           </a:p>
@@ -2082,7 +2089,7 @@
           <a:p>
             <a:fld id="{0746787B-11D1-4B91-96FD-DAFF62956ADE}" type="datetimeFigureOut">
               <a:rPr lang="de-CH" smtClean="0"/>
-              <a:t>07.11.2024</a:t>
+              <a:t>08.11.2024</a:t>
             </a:fld>
             <a:endParaRPr lang="de-CH"/>
           </a:p>
@@ -2395,7 +2402,7 @@
           <a:p>
             <a:fld id="{0746787B-11D1-4B91-96FD-DAFF62956ADE}" type="datetimeFigureOut">
               <a:rPr lang="de-CH" smtClean="0"/>
-              <a:t>07.11.2024</a:t>
+              <a:t>08.11.2024</a:t>
             </a:fld>
             <a:endParaRPr lang="de-CH"/>
           </a:p>
@@ -2684,7 +2691,7 @@
           <a:p>
             <a:fld id="{0746787B-11D1-4B91-96FD-DAFF62956ADE}" type="datetimeFigureOut">
               <a:rPr lang="de-CH" smtClean="0"/>
-              <a:t>07.11.2024</a:t>
+              <a:t>08.11.2024</a:t>
             </a:fld>
             <a:endParaRPr lang="de-CH"/>
           </a:p>
@@ -2927,7 +2934,7 @@
           <a:p>
             <a:fld id="{0746787B-11D1-4B91-96FD-DAFF62956ADE}" type="datetimeFigureOut">
               <a:rPr lang="de-CH" smtClean="0"/>
-              <a:t>07.11.2024</a:t>
+              <a:t>08.11.2024</a:t>
             </a:fld>
             <a:endParaRPr lang="de-CH"/>
           </a:p>
@@ -3422,6 +3429,14 @@
 <file path=ppt/slides/slide2.xml><?xml version="1.0" encoding="utf-8"?>
 <p:sld xmlns:a="http://schemas.openxmlformats.org/drawingml/2006/main" xmlns:r="http://schemas.openxmlformats.org/officeDocument/2006/relationships" xmlns:p="http://schemas.openxmlformats.org/presentationml/2006/main">
   <p:cSld>
+    <p:bg>
+      <p:bgPr>
+        <a:solidFill>
+          <a:schemeClr val="bg1"/>
+        </a:solidFill>
+        <a:effectLst/>
+      </p:bgPr>
+    </p:bg>
     <p:spTree>
       <p:nvGrpSpPr>
         <p:cNvPr id="1" name=""/>
@@ -3436,6 +3451,66 @@
           <a:chExt cx="0" cy="0"/>
         </a:xfrm>
       </p:grpSpPr>
+      <p:sp useBgFill="1">
+        <p:nvSpPr>
+          <p:cNvPr id="11" name="Rectangle 10">
+            <a:extLst>
+              <a:ext uri="{FF2B5EF4-FFF2-40B4-BE49-F238E27FC236}">
+                <a16:creationId xmlns:a16="http://schemas.microsoft.com/office/drawing/2014/main" id="{327D73B4-9F5C-4A64-A179-51B9500CB8B5}"/>
+              </a:ext>
+              <a:ext uri="{C183D7F6-B498-43B3-948B-1728B52AA6E4}">
+                <adec:decorative xmlns:adec="http://schemas.microsoft.com/office/drawing/2017/decorative" val="1"/>
+              </a:ext>
+            </a:extLst>
+          </p:cNvPr>
+          <p:cNvSpPr>
+            <a:spLocks noGrp="1" noRot="1" noChangeAspect="1" noMove="1" noResize="1" noEditPoints="1" noAdjustHandles="1" noChangeArrowheads="1" noChangeShapeType="1" noTextEdit="1"/>
+          </p:cNvSpPr>
+          <p:nvPr>
+            <p:extLst>
+              <p:ext uri="{386F3935-93C4-4BCD-93E2-E3B085C9AB24}">
+                <p16:designElem xmlns:p16="http://schemas.microsoft.com/office/powerpoint/2015/main" val="1"/>
+              </p:ext>
+            </p:extLst>
+          </p:nvPr>
+        </p:nvSpPr>
+        <p:spPr>
+          <a:xfrm>
+            <a:off x="0" y="0"/>
+            <a:ext cx="12192000" cy="6858000"/>
+          </a:xfrm>
+          <a:prstGeom prst="rect">
+            <a:avLst/>
+          </a:prstGeom>
+          <a:ln>
+            <a:noFill/>
+          </a:ln>
+        </p:spPr>
+        <p:style>
+          <a:lnRef idx="2">
+            <a:schemeClr val="accent1">
+              <a:shade val="50000"/>
+            </a:schemeClr>
+          </a:lnRef>
+          <a:fillRef idx="1">
+            <a:schemeClr val="accent1"/>
+          </a:fillRef>
+          <a:effectRef idx="0">
+            <a:schemeClr val="accent1"/>
+          </a:effectRef>
+          <a:fontRef idx="minor">
+            <a:schemeClr val="lt1"/>
+          </a:fontRef>
+        </p:style>
+        <p:txBody>
+          <a:bodyPr rtlCol="0" anchor="ctr"/>
+          <a:lstStyle/>
+          <a:p>
+            <a:pPr algn="ctr"/>
+            <a:endParaRPr lang="en-US" dirty="0"/>
+          </a:p>
+        </p:txBody>
+      </p:sp>
       <p:sp>
         <p:nvSpPr>
           <p:cNvPr id="2" name="Title 1">
@@ -3452,15 +3527,94 @@
             <p:ph type="title"/>
           </p:nvPr>
         </p:nvSpPr>
-        <p:spPr/>
-        <p:txBody>
-          <a:bodyPr/>
-          <a:lstStyle/>
-          <a:p>
-            <a:r>
-              <a:rPr lang="de-CH" dirty="0"/>
+        <p:spPr>
+          <a:xfrm>
+            <a:off x="6657715" y="467271"/>
+            <a:ext cx="4195674" cy="2052522"/>
+          </a:xfrm>
+        </p:spPr>
+        <p:txBody>
+          <a:bodyPr vert="horz" lIns="91440" tIns="45720" rIns="91440" bIns="45720" rtlCol="0" anchor="b">
+            <a:normAutofit/>
+          </a:bodyPr>
+          <a:lstStyle/>
+          <a:p>
+            <a:r>
+              <a:rPr lang="en-US" sz="5600"/>
               <a:t>Base Idea</a:t>
             </a:r>
+          </a:p>
+        </p:txBody>
+      </p:sp>
+      <p:sp>
+        <p:nvSpPr>
+          <p:cNvPr id="13" name="Oval 12">
+            <a:extLst>
+              <a:ext uri="{FF2B5EF4-FFF2-40B4-BE49-F238E27FC236}">
+                <a16:creationId xmlns:a16="http://schemas.microsoft.com/office/drawing/2014/main" id="{C1F06963-6374-4B48-844F-071A9BAAAE02}"/>
+              </a:ext>
+              <a:ext uri="{C183D7F6-B498-43B3-948B-1728B52AA6E4}">
+                <adec:decorative xmlns:adec="http://schemas.microsoft.com/office/drawing/2017/decorative" val="1"/>
+              </a:ext>
+            </a:extLst>
+          </p:cNvPr>
+          <p:cNvSpPr>
+            <a:spLocks noGrp="1" noRot="1" noChangeAspect="1" noMove="1" noResize="1" noEditPoints="1" noAdjustHandles="1" noChangeArrowheads="1" noChangeShapeType="1" noTextEdit="1"/>
+          </p:cNvSpPr>
+          <p:nvPr>
+            <p:extLst>
+              <p:ext uri="{386F3935-93C4-4BCD-93E2-E3B085C9AB24}">
+                <p16:designElem xmlns:p16="http://schemas.microsoft.com/office/powerpoint/2015/main" val="1"/>
+              </p:ext>
+            </p:extLst>
+          </p:nvPr>
+        </p:nvSpPr>
+        <p:spPr>
+          <a:xfrm>
+            <a:off x="322965" y="554152"/>
+            <a:ext cx="5742189" cy="5742189"/>
+          </a:xfrm>
+          <a:prstGeom prst="ellipse">
+            <a:avLst/>
+          </a:prstGeom>
+          <a:gradFill flip="none" rotWithShape="1">
+            <a:gsLst>
+              <a:gs pos="0">
+                <a:schemeClr val="accent1"/>
+              </a:gs>
+              <a:gs pos="100000">
+                <a:schemeClr val="accent2"/>
+              </a:gs>
+            </a:gsLst>
+            <a:lin ang="2700000" scaled="1"/>
+            <a:tileRect/>
+          </a:gradFill>
+          <a:ln>
+            <a:noFill/>
+          </a:ln>
+        </p:spPr>
+        <p:style>
+          <a:lnRef idx="2">
+            <a:schemeClr val="accent1">
+              <a:shade val="50000"/>
+            </a:schemeClr>
+          </a:lnRef>
+          <a:fillRef idx="1">
+            <a:schemeClr val="accent1"/>
+          </a:fillRef>
+          <a:effectRef idx="0">
+            <a:schemeClr val="accent1"/>
+          </a:effectRef>
+          <a:fontRef idx="minor">
+            <a:schemeClr val="lt1"/>
+          </a:fontRef>
+        </p:style>
+        <p:txBody>
+          <a:bodyPr rtlCol="0" anchor="ctr"/>
+          <a:lstStyle/>
+          <a:p>
+            <a:pPr algn="ctr"/>
+            <a:endParaRPr lang="en-US"/>
           </a:p>
         </p:txBody>
       </p:sp>
@@ -3488,96 +3642,708 @@
               </a:ext>
             </a:extLst>
           </a:blip>
-          <a:stretch>
-            <a:fillRect/>
-          </a:stretch>
+          <a:srcRect r="-3" b="-3"/>
+          <a:stretch/>
         </p:blipFill>
         <p:spPr>
           <a:xfrm>
-            <a:off x="5832475" y="987425"/>
-            <a:ext cx="4873625" cy="4873625"/>
+            <a:off x="505418" y="554151"/>
+            <a:ext cx="5742189" cy="5742189"/>
+          </a:xfrm>
+          <a:custGeom>
+            <a:avLst/>
+            <a:gdLst/>
+            <a:ahLst/>
+            <a:cxnLst/>
+            <a:rect l="l" t="t" r="r" b="b"/>
+            <a:pathLst>
+              <a:path w="1838528" h="1838528">
+                <a:moveTo>
+                  <a:pt x="919264" y="0"/>
+                </a:moveTo>
+                <a:cubicBezTo>
+                  <a:pt x="1426959" y="0"/>
+                  <a:pt x="1838528" y="411569"/>
+                  <a:pt x="1838528" y="919264"/>
+                </a:cubicBezTo>
+                <a:cubicBezTo>
+                  <a:pt x="1838528" y="1426959"/>
+                  <a:pt x="1426959" y="1838528"/>
+                  <a:pt x="919264" y="1838528"/>
+                </a:cubicBezTo>
+                <a:cubicBezTo>
+                  <a:pt x="411569" y="1838528"/>
+                  <a:pt x="0" y="1426959"/>
+                  <a:pt x="0" y="919264"/>
+                </a:cubicBezTo>
+                <a:cubicBezTo>
+                  <a:pt x="0" y="411569"/>
+                  <a:pt x="411569" y="0"/>
+                  <a:pt x="919264" y="0"/>
+                </a:cubicBezTo>
+                <a:close/>
+              </a:path>
+            </a:pathLst>
+          </a:custGeom>
+        </p:spPr>
+      </p:pic>
+      <p:sp>
+        <p:nvSpPr>
+          <p:cNvPr id="15" name="!!plus graphic">
+            <a:extLst>
+              <a:ext uri="{FF2B5EF4-FFF2-40B4-BE49-F238E27FC236}">
+                <a16:creationId xmlns:a16="http://schemas.microsoft.com/office/drawing/2014/main" id="{6CB927A4-E432-4310-9CD5-E89FF5063179}"/>
+              </a:ext>
+              <a:ext uri="{C183D7F6-B498-43B3-948B-1728B52AA6E4}">
+                <adec:decorative xmlns:adec="http://schemas.microsoft.com/office/drawing/2017/decorative" val="1"/>
+              </a:ext>
+            </a:extLst>
+          </p:cNvPr>
+          <p:cNvSpPr>
+            <a:spLocks noGrp="1" noRot="1" noChangeAspect="1" noMove="1" noResize="1" noEditPoints="1" noAdjustHandles="1" noChangeArrowheads="1" noChangeShapeType="1" noTextEdit="1"/>
+          </p:cNvSpPr>
+          <p:nvPr>
+            <p:extLst>
+              <p:ext uri="{386F3935-93C4-4BCD-93E2-E3B085C9AB24}">
+                <p16:designElem xmlns:p16="http://schemas.microsoft.com/office/powerpoint/2015/main" val="1"/>
+              </p:ext>
+            </p:extLst>
+          </p:nvPr>
+        </p:nvSpPr>
+        <p:spPr>
+          <a:xfrm>
+            <a:off x="1004956" y="703679"/>
+            <a:ext cx="171515" cy="171515"/>
+          </a:xfrm>
+          <a:custGeom>
+            <a:avLst/>
+            <a:gdLst>
+              <a:gd name="connsiteX0" fmla="*/ 159874 w 171515"/>
+              <a:gd name="connsiteY0" fmla="*/ 74116 h 171515"/>
+              <a:gd name="connsiteX1" fmla="*/ 97399 w 171515"/>
+              <a:gd name="connsiteY1" fmla="*/ 74116 h 171515"/>
+              <a:gd name="connsiteX2" fmla="*/ 97399 w 171515"/>
+              <a:gd name="connsiteY2" fmla="*/ 11641 h 171515"/>
+              <a:gd name="connsiteX3" fmla="*/ 85758 w 171515"/>
+              <a:gd name="connsiteY3" fmla="*/ 0 h 171515"/>
+              <a:gd name="connsiteX4" fmla="*/ 74116 w 171515"/>
+              <a:gd name="connsiteY4" fmla="*/ 11641 h 171515"/>
+              <a:gd name="connsiteX5" fmla="*/ 74116 w 171515"/>
+              <a:gd name="connsiteY5" fmla="*/ 74116 h 171515"/>
+              <a:gd name="connsiteX6" fmla="*/ 11641 w 171515"/>
+              <a:gd name="connsiteY6" fmla="*/ 74116 h 171515"/>
+              <a:gd name="connsiteX7" fmla="*/ 0 w 171515"/>
+              <a:gd name="connsiteY7" fmla="*/ 85758 h 171515"/>
+              <a:gd name="connsiteX8" fmla="*/ 11641 w 171515"/>
+              <a:gd name="connsiteY8" fmla="*/ 97399 h 171515"/>
+              <a:gd name="connsiteX9" fmla="*/ 74116 w 171515"/>
+              <a:gd name="connsiteY9" fmla="*/ 97399 h 171515"/>
+              <a:gd name="connsiteX10" fmla="*/ 74116 w 171515"/>
+              <a:gd name="connsiteY10" fmla="*/ 159874 h 171515"/>
+              <a:gd name="connsiteX11" fmla="*/ 85758 w 171515"/>
+              <a:gd name="connsiteY11" fmla="*/ 171515 h 171515"/>
+              <a:gd name="connsiteX12" fmla="*/ 97399 w 171515"/>
+              <a:gd name="connsiteY12" fmla="*/ 159874 h 171515"/>
+              <a:gd name="connsiteX13" fmla="*/ 97399 w 171515"/>
+              <a:gd name="connsiteY13" fmla="*/ 97399 h 171515"/>
+              <a:gd name="connsiteX14" fmla="*/ 159874 w 171515"/>
+              <a:gd name="connsiteY14" fmla="*/ 97399 h 171515"/>
+              <a:gd name="connsiteX15" fmla="*/ 171515 w 171515"/>
+              <a:gd name="connsiteY15" fmla="*/ 85758 h 171515"/>
+              <a:gd name="connsiteX16" fmla="*/ 159874 w 171515"/>
+              <a:gd name="connsiteY16" fmla="*/ 74116 h 171515"/>
+            </a:gdLst>
+            <a:ahLst/>
+            <a:cxnLst>
+              <a:cxn ang="0">
+                <a:pos x="connsiteX0" y="connsiteY0"/>
+              </a:cxn>
+              <a:cxn ang="0">
+                <a:pos x="connsiteX1" y="connsiteY1"/>
+              </a:cxn>
+              <a:cxn ang="0">
+                <a:pos x="connsiteX2" y="connsiteY2"/>
+              </a:cxn>
+              <a:cxn ang="0">
+                <a:pos x="connsiteX3" y="connsiteY3"/>
+              </a:cxn>
+              <a:cxn ang="0">
+                <a:pos x="connsiteX4" y="connsiteY4"/>
+              </a:cxn>
+              <a:cxn ang="0">
+                <a:pos x="connsiteX5" y="connsiteY5"/>
+              </a:cxn>
+              <a:cxn ang="0">
+                <a:pos x="connsiteX6" y="connsiteY6"/>
+              </a:cxn>
+              <a:cxn ang="0">
+                <a:pos x="connsiteX7" y="connsiteY7"/>
+              </a:cxn>
+              <a:cxn ang="0">
+                <a:pos x="connsiteX8" y="connsiteY8"/>
+              </a:cxn>
+              <a:cxn ang="0">
+                <a:pos x="connsiteX9" y="connsiteY9"/>
+              </a:cxn>
+              <a:cxn ang="0">
+                <a:pos x="connsiteX10" y="connsiteY10"/>
+              </a:cxn>
+              <a:cxn ang="0">
+                <a:pos x="connsiteX11" y="connsiteY11"/>
+              </a:cxn>
+              <a:cxn ang="0">
+                <a:pos x="connsiteX12" y="connsiteY12"/>
+              </a:cxn>
+              <a:cxn ang="0">
+                <a:pos x="connsiteX13" y="connsiteY13"/>
+              </a:cxn>
+              <a:cxn ang="0">
+                <a:pos x="connsiteX14" y="connsiteY14"/>
+              </a:cxn>
+              <a:cxn ang="0">
+                <a:pos x="connsiteX15" y="connsiteY15"/>
+              </a:cxn>
+              <a:cxn ang="0">
+                <a:pos x="connsiteX16" y="connsiteY16"/>
+              </a:cxn>
+            </a:cxnLst>
+            <a:rect l="l" t="t" r="r" b="b"/>
+            <a:pathLst>
+              <a:path w="171515" h="171515">
+                <a:moveTo>
+                  <a:pt x="159874" y="74116"/>
+                </a:moveTo>
+                <a:lnTo>
+                  <a:pt x="97399" y="74116"/>
+                </a:lnTo>
+                <a:lnTo>
+                  <a:pt x="97399" y="11641"/>
+                </a:lnTo>
+                <a:cubicBezTo>
+                  <a:pt x="97399" y="5212"/>
+                  <a:pt x="92187" y="0"/>
+                  <a:pt x="85758" y="0"/>
+                </a:cubicBezTo>
+                <a:cubicBezTo>
+                  <a:pt x="79328" y="0"/>
+                  <a:pt x="74116" y="5212"/>
+                  <a:pt x="74116" y="11641"/>
+                </a:cubicBezTo>
+                <a:lnTo>
+                  <a:pt x="74116" y="74116"/>
+                </a:lnTo>
+                <a:lnTo>
+                  <a:pt x="11641" y="74116"/>
+                </a:lnTo>
+                <a:cubicBezTo>
+                  <a:pt x="5212" y="74116"/>
+                  <a:pt x="0" y="79328"/>
+                  <a:pt x="0" y="85758"/>
+                </a:cubicBezTo>
+                <a:cubicBezTo>
+                  <a:pt x="0" y="92187"/>
+                  <a:pt x="5212" y="97399"/>
+                  <a:pt x="11641" y="97399"/>
+                </a:cubicBezTo>
+                <a:lnTo>
+                  <a:pt x="74116" y="97399"/>
+                </a:lnTo>
+                <a:lnTo>
+                  <a:pt x="74116" y="159874"/>
+                </a:lnTo>
+                <a:cubicBezTo>
+                  <a:pt x="74116" y="166303"/>
+                  <a:pt x="79328" y="171515"/>
+                  <a:pt x="85758" y="171515"/>
+                </a:cubicBezTo>
+                <a:cubicBezTo>
+                  <a:pt x="92187" y="171515"/>
+                  <a:pt x="97399" y="166303"/>
+                  <a:pt x="97399" y="159874"/>
+                </a:cubicBezTo>
+                <a:lnTo>
+                  <a:pt x="97399" y="97399"/>
+                </a:lnTo>
+                <a:lnTo>
+                  <a:pt x="159874" y="97399"/>
+                </a:lnTo>
+                <a:cubicBezTo>
+                  <a:pt x="166303" y="97399"/>
+                  <a:pt x="171515" y="92187"/>
+                  <a:pt x="171515" y="85758"/>
+                </a:cubicBezTo>
+                <a:cubicBezTo>
+                  <a:pt x="171515" y="79328"/>
+                  <a:pt x="166303" y="74116"/>
+                  <a:pt x="159874" y="74116"/>
+                </a:cubicBezTo>
+                <a:close/>
+              </a:path>
+            </a:pathLst>
+          </a:custGeom>
+          <a:solidFill>
+            <a:schemeClr val="accent1"/>
+          </a:solidFill>
+          <a:ln w="776" cap="flat">
+            <a:noFill/>
+            <a:prstDash val="solid"/>
+            <a:miter/>
+          </a:ln>
+        </p:spPr>
+        <p:txBody>
+          <a:bodyPr rtlCol="0" anchor="ctr"/>
+          <a:lstStyle/>
+          <a:p>
+            <a:endParaRPr lang="en-US"/>
+          </a:p>
+        </p:txBody>
+      </p:sp>
+      <p:sp>
+        <p:nvSpPr>
+          <p:cNvPr id="17" name="!!circle graphic">
+            <a:extLst>
+              <a:ext uri="{FF2B5EF4-FFF2-40B4-BE49-F238E27FC236}">
+                <a16:creationId xmlns:a16="http://schemas.microsoft.com/office/drawing/2014/main" id="{1453BF6C-B012-48B7-B4E8-6D7AC7C27D02}"/>
+              </a:ext>
+              <a:ext uri="{C183D7F6-B498-43B3-948B-1728B52AA6E4}">
+                <adec:decorative xmlns:adec="http://schemas.microsoft.com/office/drawing/2017/decorative" val="1"/>
+              </a:ext>
+            </a:extLst>
+          </p:cNvPr>
+          <p:cNvSpPr>
+            <a:spLocks noGrp="1" noRot="1" noChangeAspect="1" noMove="1" noResize="1" noEditPoints="1" noAdjustHandles="1" noChangeArrowheads="1" noChangeShapeType="1" noTextEdit="1"/>
+          </p:cNvSpPr>
+          <p:nvPr>
+            <p:extLst>
+              <p:ext uri="{386F3935-93C4-4BCD-93E2-E3B085C9AB24}">
+                <p16:designElem xmlns:p16="http://schemas.microsoft.com/office/powerpoint/2015/main" val="1"/>
+              </p:ext>
+            </p:extLst>
+          </p:nvPr>
+        </p:nvSpPr>
+        <p:spPr>
+          <a:xfrm>
+            <a:off x="422753" y="1562696"/>
+            <a:ext cx="157545" cy="157545"/>
+          </a:xfrm>
+          <a:custGeom>
+            <a:avLst/>
+            <a:gdLst>
+              <a:gd name="connsiteX0" fmla="*/ 78773 w 157545"/>
+              <a:gd name="connsiteY0" fmla="*/ 23283 h 157545"/>
+              <a:gd name="connsiteX1" fmla="*/ 134262 w 157545"/>
+              <a:gd name="connsiteY1" fmla="*/ 78773 h 157545"/>
+              <a:gd name="connsiteX2" fmla="*/ 78773 w 157545"/>
+              <a:gd name="connsiteY2" fmla="*/ 134262 h 157545"/>
+              <a:gd name="connsiteX3" fmla="*/ 23283 w 157545"/>
+              <a:gd name="connsiteY3" fmla="*/ 78773 h 157545"/>
+              <a:gd name="connsiteX4" fmla="*/ 78773 w 157545"/>
+              <a:gd name="connsiteY4" fmla="*/ 23283 h 157545"/>
+              <a:gd name="connsiteX5" fmla="*/ 78773 w 157545"/>
+              <a:gd name="connsiteY5" fmla="*/ 0 h 157545"/>
+              <a:gd name="connsiteX6" fmla="*/ 0 w 157545"/>
+              <a:gd name="connsiteY6" fmla="*/ 78773 h 157545"/>
+              <a:gd name="connsiteX7" fmla="*/ 78773 w 157545"/>
+              <a:gd name="connsiteY7" fmla="*/ 157545 h 157545"/>
+              <a:gd name="connsiteX8" fmla="*/ 157545 w 157545"/>
+              <a:gd name="connsiteY8" fmla="*/ 78773 h 157545"/>
+              <a:gd name="connsiteX9" fmla="*/ 78773 w 157545"/>
+              <a:gd name="connsiteY9" fmla="*/ 0 h 157545"/>
+            </a:gdLst>
+            <a:ahLst/>
+            <a:cxnLst>
+              <a:cxn ang="0">
+                <a:pos x="connsiteX0" y="connsiteY0"/>
+              </a:cxn>
+              <a:cxn ang="0">
+                <a:pos x="connsiteX1" y="connsiteY1"/>
+              </a:cxn>
+              <a:cxn ang="0">
+                <a:pos x="connsiteX2" y="connsiteY2"/>
+              </a:cxn>
+              <a:cxn ang="0">
+                <a:pos x="connsiteX3" y="connsiteY3"/>
+              </a:cxn>
+              <a:cxn ang="0">
+                <a:pos x="connsiteX4" y="connsiteY4"/>
+              </a:cxn>
+              <a:cxn ang="0">
+                <a:pos x="connsiteX5" y="connsiteY5"/>
+              </a:cxn>
+              <a:cxn ang="0">
+                <a:pos x="connsiteX6" y="connsiteY6"/>
+              </a:cxn>
+              <a:cxn ang="0">
+                <a:pos x="connsiteX7" y="connsiteY7"/>
+              </a:cxn>
+              <a:cxn ang="0">
+                <a:pos x="connsiteX8" y="connsiteY8"/>
+              </a:cxn>
+              <a:cxn ang="0">
+                <a:pos x="connsiteX9" y="connsiteY9"/>
+              </a:cxn>
+            </a:cxnLst>
+            <a:rect l="l" t="t" r="r" b="b"/>
+            <a:pathLst>
+              <a:path w="157545" h="157545">
+                <a:moveTo>
+                  <a:pt x="78773" y="23283"/>
+                </a:moveTo>
+                <a:cubicBezTo>
+                  <a:pt x="109419" y="23283"/>
+                  <a:pt x="134262" y="48126"/>
+                  <a:pt x="134262" y="78773"/>
+                </a:cubicBezTo>
+                <a:cubicBezTo>
+                  <a:pt x="134262" y="109419"/>
+                  <a:pt x="109419" y="134262"/>
+                  <a:pt x="78773" y="134262"/>
+                </a:cubicBezTo>
+                <a:cubicBezTo>
+                  <a:pt x="48126" y="134262"/>
+                  <a:pt x="23283" y="109419"/>
+                  <a:pt x="23283" y="78773"/>
+                </a:cubicBezTo>
+                <a:cubicBezTo>
+                  <a:pt x="23312" y="48139"/>
+                  <a:pt x="48139" y="23312"/>
+                  <a:pt x="78773" y="23283"/>
+                </a:cubicBezTo>
+                <a:moveTo>
+                  <a:pt x="78773" y="0"/>
+                </a:moveTo>
+                <a:cubicBezTo>
+                  <a:pt x="35268" y="0"/>
+                  <a:pt x="0" y="35268"/>
+                  <a:pt x="0" y="78773"/>
+                </a:cubicBezTo>
+                <a:cubicBezTo>
+                  <a:pt x="0" y="122277"/>
+                  <a:pt x="35268" y="157545"/>
+                  <a:pt x="78773" y="157545"/>
+                </a:cubicBezTo>
+                <a:cubicBezTo>
+                  <a:pt x="122277" y="157545"/>
+                  <a:pt x="157545" y="122277"/>
+                  <a:pt x="157545" y="78773"/>
+                </a:cubicBezTo>
+                <a:cubicBezTo>
+                  <a:pt x="157545" y="35268"/>
+                  <a:pt x="122277" y="0"/>
+                  <a:pt x="78773" y="0"/>
+                </a:cubicBezTo>
+                <a:close/>
+              </a:path>
+            </a:pathLst>
+          </a:custGeom>
+          <a:solidFill>
+            <a:schemeClr val="accent1"/>
+          </a:solidFill>
+          <a:ln w="751" cap="flat">
+            <a:noFill/>
+            <a:prstDash val="solid"/>
+            <a:miter/>
+          </a:ln>
+        </p:spPr>
+        <p:txBody>
+          <a:bodyPr rtlCol="0" anchor="ctr"/>
+          <a:lstStyle/>
+          <a:p>
+            <a:endParaRPr lang="en-US"/>
+          </a:p>
+        </p:txBody>
+      </p:sp>
+      <p:sp>
+        <p:nvSpPr>
+          <p:cNvPr id="4" name="Text Placeholder 3">
+            <a:extLst>
+              <a:ext uri="{FF2B5EF4-FFF2-40B4-BE49-F238E27FC236}">
+                <a16:creationId xmlns:a16="http://schemas.microsoft.com/office/drawing/2014/main" id="{3E0EFA19-3476-09AE-07B0-2816A98494E6}"/>
+              </a:ext>
+            </a:extLst>
+          </p:cNvPr>
+          <p:cNvSpPr>
+            <a:spLocks noGrp="1"/>
+          </p:cNvSpPr>
+          <p:nvPr>
+            <p:ph type="body" sz="half" idx="2"/>
+          </p:nvPr>
+        </p:nvSpPr>
+        <p:spPr>
+          <a:xfrm>
+            <a:off x="6657715" y="2990818"/>
+            <a:ext cx="4195673" cy="2913872"/>
           </a:xfrm>
         </p:spPr>
-      </p:pic>
-      <p:sp>
-        <p:nvSpPr>
-          <p:cNvPr id="4" name="Text Placeholder 3">
-            <a:extLst>
-              <a:ext uri="{FF2B5EF4-FFF2-40B4-BE49-F238E27FC236}">
-                <a16:creationId xmlns:a16="http://schemas.microsoft.com/office/drawing/2014/main" id="{3E0EFA19-3476-09AE-07B0-2816A98494E6}"/>
-              </a:ext>
-            </a:extLst>
-          </p:cNvPr>
-          <p:cNvSpPr>
-            <a:spLocks noGrp="1"/>
-          </p:cNvSpPr>
-          <p:nvPr>
-            <p:ph type="body" sz="half" idx="2"/>
-          </p:nvPr>
-        </p:nvSpPr>
-        <p:spPr/>
-        <p:txBody>
-          <a:bodyPr/>
-          <a:lstStyle/>
-          <a:p>
-            <a:pPr marL="285750" indent="-285750">
+        <p:txBody>
+          <a:bodyPr vert="horz" lIns="91440" tIns="45720" rIns="91440" bIns="45720" rtlCol="0" anchor="t">
+            <a:normAutofit/>
+          </a:bodyPr>
+          <a:lstStyle/>
+          <a:p>
+            <a:pPr marL="285750" indent="-228600">
               <a:buFont typeface="Arial" panose="020B0604020202020204" pitchFamily="34" charset="0"/>
               <a:buChar char="•"/>
             </a:pPr>
             <a:r>
-              <a:rPr lang="de-CH" dirty="0"/>
+              <a:rPr lang="en-US" sz="2000">
+                <a:solidFill>
+                  <a:schemeClr val="tx1">
+                    <a:alpha val="80000"/>
+                  </a:schemeClr>
+                </a:solidFill>
+              </a:rPr>
               <a:t>DND Session Recording</a:t>
             </a:r>
           </a:p>
           <a:p>
-            <a:pPr marL="285750" indent="-285750">
+            <a:pPr marL="285750" indent="-228600">
               <a:buFont typeface="Arial" panose="020B0604020202020204" pitchFamily="34" charset="0"/>
               <a:buChar char="•"/>
             </a:pPr>
             <a:r>
-              <a:rPr lang="de-CH" dirty="0"/>
+              <a:rPr lang="en-US" sz="2000">
+                <a:solidFill>
+                  <a:schemeClr val="tx1">
+                    <a:alpha val="80000"/>
+                  </a:schemeClr>
+                </a:solidFill>
+              </a:rPr>
               <a:t>Speech to text</a:t>
             </a:r>
           </a:p>
           <a:p>
-            <a:pPr marL="285750" indent="-285750">
+            <a:pPr marL="285750" indent="-228600">
               <a:buFont typeface="Arial" panose="020B0604020202020204" pitchFamily="34" charset="0"/>
               <a:buChar char="•"/>
             </a:pPr>
             <a:r>
-              <a:rPr lang="de-CH" dirty="0"/>
+              <a:rPr lang="en-US" sz="2000">
+                <a:solidFill>
+                  <a:schemeClr val="tx1">
+                    <a:alpha val="80000"/>
+                  </a:schemeClr>
+                </a:solidFill>
+              </a:rPr>
               <a:t>Promting using LLM</a:t>
             </a:r>
           </a:p>
           <a:p>
-            <a:pPr marL="285750" indent="-285750">
+            <a:pPr marL="285750" indent="-228600">
               <a:buFont typeface="Arial" panose="020B0604020202020204" pitchFamily="34" charset="0"/>
               <a:buChar char="•"/>
             </a:pPr>
             <a:r>
-              <a:rPr lang="de-CH" dirty="0"/>
+              <a:rPr lang="en-US" sz="2000">
+                <a:solidFill>
+                  <a:schemeClr val="tx1">
+                    <a:alpha val="80000"/>
+                  </a:schemeClr>
+                </a:solidFill>
+              </a:rPr>
               <a:t>Image Generation using live Prompt</a:t>
             </a:r>
           </a:p>
           <a:p>
-            <a:pPr marL="285750" indent="-285750">
+            <a:pPr marL="285750" indent="-228600">
               <a:buFont typeface="Arial" panose="020B0604020202020204" pitchFamily="34" charset="0"/>
               <a:buChar char="•"/>
             </a:pPr>
             <a:r>
-              <a:rPr lang="de-CH" dirty="0"/>
+              <a:rPr lang="en-US" sz="2000">
+                <a:solidFill>
+                  <a:schemeClr val="tx1">
+                    <a:alpha val="80000"/>
+                  </a:schemeClr>
+                </a:solidFill>
+              </a:rPr>
               <a:t>Displaying Image as soon as Available</a:t>
             </a:r>
           </a:p>
           <a:p>
-            <a:pPr marL="285750" indent="-285750">
+            <a:pPr marL="285750" indent="-228600">
               <a:buFont typeface="Arial" panose="020B0604020202020204" pitchFamily="34" charset="0"/>
               <a:buChar char="•"/>
             </a:pPr>
-            <a:endParaRPr lang="de-CH" dirty="0"/>
-          </a:p>
-        </p:txBody>
-      </p:sp>
+            <a:endParaRPr lang="en-US" sz="2000">
+              <a:solidFill>
+                <a:schemeClr val="tx1">
+                  <a:alpha val="80000"/>
+                </a:schemeClr>
+              </a:solidFill>
+            </a:endParaRPr>
+          </a:p>
+        </p:txBody>
+      </p:sp>
+      <p:sp>
+        <p:nvSpPr>
+          <p:cNvPr id="19" name="!!dot graphic">
+            <a:extLst>
+              <a:ext uri="{FF2B5EF4-FFF2-40B4-BE49-F238E27FC236}">
+                <a16:creationId xmlns:a16="http://schemas.microsoft.com/office/drawing/2014/main" id="{E3020543-B24B-4EC4-8FFC-8DD88EEA91A8}"/>
+              </a:ext>
+              <a:ext uri="{C183D7F6-B498-43B3-948B-1728B52AA6E4}">
+                <adec:decorative xmlns:adec="http://schemas.microsoft.com/office/drawing/2017/decorative" val="1"/>
+              </a:ext>
+            </a:extLst>
+          </p:cNvPr>
+          <p:cNvSpPr>
+            <a:spLocks noGrp="1" noRot="1" noChangeAspect="1" noMove="1" noResize="1" noEditPoints="1" noAdjustHandles="1" noChangeArrowheads="1" noChangeShapeType="1" noTextEdit="1"/>
+          </p:cNvSpPr>
+          <p:nvPr>
+            <p:extLst>
+              <p:ext uri="{386F3935-93C4-4BCD-93E2-E3B085C9AB24}">
+                <p16:designElem xmlns:p16="http://schemas.microsoft.com/office/powerpoint/2015/main" val="1"/>
+              </p:ext>
+            </p:extLst>
+          </p:nvPr>
+        </p:nvSpPr>
+        <p:spPr>
+          <a:xfrm>
+            <a:off x="5454149" y="5775082"/>
+            <a:ext cx="112426" cy="112426"/>
+          </a:xfrm>
+          <a:custGeom>
+            <a:avLst/>
+            <a:gdLst>
+              <a:gd name="connsiteX0" fmla="*/ 112426 w 112426"/>
+              <a:gd name="connsiteY0" fmla="*/ 56213 h 112426"/>
+              <a:gd name="connsiteX1" fmla="*/ 56213 w 112426"/>
+              <a:gd name="connsiteY1" fmla="*/ 112426 h 112426"/>
+              <a:gd name="connsiteX2" fmla="*/ 0 w 112426"/>
+              <a:gd name="connsiteY2" fmla="*/ 56213 h 112426"/>
+              <a:gd name="connsiteX3" fmla="*/ 56213 w 112426"/>
+              <a:gd name="connsiteY3" fmla="*/ 0 h 112426"/>
+              <a:gd name="connsiteX4" fmla="*/ 112426 w 112426"/>
+              <a:gd name="connsiteY4" fmla="*/ 56213 h 112426"/>
+            </a:gdLst>
+            <a:ahLst/>
+            <a:cxnLst>
+              <a:cxn ang="0">
+                <a:pos x="connsiteX0" y="connsiteY0"/>
+              </a:cxn>
+              <a:cxn ang="0">
+                <a:pos x="connsiteX1" y="connsiteY1"/>
+              </a:cxn>
+              <a:cxn ang="0">
+                <a:pos x="connsiteX2" y="connsiteY2"/>
+              </a:cxn>
+              <a:cxn ang="0">
+                <a:pos x="connsiteX3" y="connsiteY3"/>
+              </a:cxn>
+              <a:cxn ang="0">
+                <a:pos x="connsiteX4" y="connsiteY4"/>
+              </a:cxn>
+            </a:cxnLst>
+            <a:rect l="l" t="t" r="r" b="b"/>
+            <a:pathLst>
+              <a:path w="112426" h="112426">
+                <a:moveTo>
+                  <a:pt x="112426" y="56213"/>
+                </a:moveTo>
+                <a:cubicBezTo>
+                  <a:pt x="112426" y="87259"/>
+                  <a:pt x="87259" y="112426"/>
+                  <a:pt x="56213" y="112426"/>
+                </a:cubicBezTo>
+                <a:cubicBezTo>
+                  <a:pt x="25167" y="112426"/>
+                  <a:pt x="0" y="87259"/>
+                  <a:pt x="0" y="56213"/>
+                </a:cubicBezTo>
+                <a:cubicBezTo>
+                  <a:pt x="0" y="25167"/>
+                  <a:pt x="25167" y="0"/>
+                  <a:pt x="56213" y="0"/>
+                </a:cubicBezTo>
+                <a:cubicBezTo>
+                  <a:pt x="87259" y="0"/>
+                  <a:pt x="112426" y="25167"/>
+                  <a:pt x="112426" y="56213"/>
+                </a:cubicBezTo>
+                <a:close/>
+              </a:path>
+            </a:pathLst>
+          </a:custGeom>
+          <a:solidFill>
+            <a:schemeClr val="accent1"/>
+          </a:solidFill>
+          <a:ln w="516" cap="flat">
+            <a:noFill/>
+            <a:prstDash val="solid"/>
+            <a:miter/>
+          </a:ln>
+        </p:spPr>
+        <p:txBody>
+          <a:bodyPr rtlCol="0" anchor="ctr"/>
+          <a:lstStyle/>
+          <a:p>
+            <a:endParaRPr lang="en-US"/>
+          </a:p>
+        </p:txBody>
+      </p:sp>
+      <p:cxnSp>
+        <p:nvCxnSpPr>
+          <p:cNvPr id="21" name="!!Straight Connector">
+            <a:extLst>
+              <a:ext uri="{FF2B5EF4-FFF2-40B4-BE49-F238E27FC236}">
+                <a16:creationId xmlns:a16="http://schemas.microsoft.com/office/drawing/2014/main" id="{C49DA8F6-BCC1-4447-B54C-57856834B94B}"/>
+              </a:ext>
+              <a:ext uri="{C183D7F6-B498-43B3-948B-1728B52AA6E4}">
+                <adec:decorative xmlns:adec="http://schemas.microsoft.com/office/drawing/2017/decorative" val="1"/>
+              </a:ext>
+            </a:extLst>
+          </p:cNvPr>
+          <p:cNvCxnSpPr>
+            <a:cxnSpLocks noGrp="1" noRot="1" noChangeAspect="1" noMove="1" noResize="1" noEditPoints="1" noAdjustHandles="1" noChangeArrowheads="1" noChangeShapeType="1"/>
+          </p:cNvCxnSpPr>
+          <p:nvPr>
+            <p:extLst>
+              <p:ext uri="{386F3935-93C4-4BCD-93E2-E3B085C9AB24}">
+                <p16:designElem xmlns:p16="http://schemas.microsoft.com/office/powerpoint/2015/main" val="1"/>
+              </p:ext>
+            </p:extLst>
+          </p:nvPr>
+        </p:nvCxnSpPr>
+        <p:spPr>
+          <a:xfrm>
+            <a:off x="11586162" y="3619272"/>
+            <a:ext cx="0" cy="3238728"/>
+          </a:xfrm>
+          <a:prstGeom prst="line">
+            <a:avLst/>
+          </a:prstGeom>
+          <a:ln w="25400" cap="sq">
+            <a:gradFill flip="none" rotWithShape="1">
+              <a:gsLst>
+                <a:gs pos="0">
+                  <a:schemeClr val="accent1"/>
+                </a:gs>
+                <a:gs pos="100000">
+                  <a:schemeClr val="accent2"/>
+                </a:gs>
+              </a:gsLst>
+              <a:lin ang="16200000" scaled="1"/>
+              <a:tileRect/>
+            </a:gradFill>
+            <a:bevel/>
+          </a:ln>
+        </p:spPr>
+        <p:style>
+          <a:lnRef idx="1">
+            <a:schemeClr val="accent1"/>
+          </a:lnRef>
+          <a:fillRef idx="0">
+            <a:schemeClr val="accent1"/>
+          </a:fillRef>
+          <a:effectRef idx="0">
+            <a:schemeClr val="accent1"/>
+          </a:effectRef>
+          <a:fontRef idx="minor">
+            <a:schemeClr val="tx1"/>
+          </a:fontRef>
+        </p:style>
+      </p:cxnSp>
     </p:spTree>
     <p:extLst>
       <p:ext uri="{BB962C8B-B14F-4D97-AF65-F5344CB8AC3E}">
@@ -3594,6 +4360,14 @@
 <file path=ppt/slides/slide3.xml><?xml version="1.0" encoding="utf-8"?>
 <p:sld xmlns:a="http://schemas.openxmlformats.org/drawingml/2006/main" xmlns:r="http://schemas.openxmlformats.org/officeDocument/2006/relationships" xmlns:p="http://schemas.openxmlformats.org/presentationml/2006/main">
   <p:cSld>
+    <p:bg>
+      <p:bgPr>
+        <a:solidFill>
+          <a:schemeClr val="bg1"/>
+        </a:solidFill>
+        <a:effectLst/>
+      </p:bgPr>
+    </p:bg>
     <p:spTree>
       <p:nvGrpSpPr>
         <p:cNvPr id="1" name=""/>
@@ -3608,60 +4382,985 @@
           <a:chExt cx="0" cy="0"/>
         </a:xfrm>
       </p:grpSpPr>
-      <p:sp>
-        <p:nvSpPr>
-          <p:cNvPr id="2" name="Title 1">
-            <a:extLst>
-              <a:ext uri="{FF2B5EF4-FFF2-40B4-BE49-F238E27FC236}">
-                <a16:creationId xmlns:a16="http://schemas.microsoft.com/office/drawing/2014/main" id="{2FF9F451-2D20-B35E-0075-0D192648B824}"/>
-              </a:ext>
-            </a:extLst>
-          </p:cNvPr>
-          <p:cNvSpPr>
-            <a:spLocks noGrp="1"/>
-          </p:cNvSpPr>
-          <p:nvPr>
-            <p:ph type="title"/>
-          </p:nvPr>
-        </p:nvSpPr>
-        <p:spPr/>
-        <p:txBody>
-          <a:bodyPr/>
-          <a:lstStyle/>
-          <a:p>
-            <a:r>
-              <a:rPr lang="de-CH" dirty="0"/>
-              <a:t>Technologies</a:t>
-            </a:r>
-          </a:p>
-        </p:txBody>
-      </p:sp>
-      <p:sp>
-        <p:nvSpPr>
-          <p:cNvPr id="3" name="TextBox 2">
-            <a:extLst>
-              <a:ext uri="{FF2B5EF4-FFF2-40B4-BE49-F238E27FC236}">
-                <a16:creationId xmlns:a16="http://schemas.microsoft.com/office/drawing/2014/main" id="{E6636AC1-02C9-9AAE-9069-D14D1254A3C7}"/>
-              </a:ext>
-            </a:extLst>
-          </p:cNvPr>
-          <p:cNvSpPr txBox="1"/>
-          <p:nvPr/>
+      <p:sp useBgFill="1">
+        <p:nvSpPr>
+          <p:cNvPr id="22" name="Rectangle 21">
+            <a:extLst>
+              <a:ext uri="{FF2B5EF4-FFF2-40B4-BE49-F238E27FC236}">
+                <a16:creationId xmlns:a16="http://schemas.microsoft.com/office/drawing/2014/main" id="{F13C74B1-5B17-4795-BED0-7140497B445A}"/>
+              </a:ext>
+              <a:ext uri="{C183D7F6-B498-43B3-948B-1728B52AA6E4}">
+                <adec:decorative xmlns:adec="http://schemas.microsoft.com/office/drawing/2017/decorative" val="1"/>
+              </a:ext>
+            </a:extLst>
+          </p:cNvPr>
+          <p:cNvSpPr>
+            <a:spLocks noGrp="1" noRot="1" noChangeAspect="1" noMove="1" noResize="1" noEditPoints="1" noAdjustHandles="1" noChangeArrowheads="1" noChangeShapeType="1" noTextEdit="1"/>
+          </p:cNvSpPr>
+          <p:nvPr>
+            <p:extLst>
+              <p:ext uri="{386F3935-93C4-4BCD-93E2-E3B085C9AB24}">
+                <p16:designElem xmlns:p16="http://schemas.microsoft.com/office/powerpoint/2015/main" val="1"/>
+              </p:ext>
+            </p:extLst>
+          </p:nvPr>
         </p:nvSpPr>
         <p:spPr>
           <a:xfrm>
-            <a:off x="975815" y="1910687"/>
-            <a:ext cx="9021170" cy="1754326"/>
+            <a:off x="0" y="0"/>
+            <a:ext cx="12188952" cy="6858000"/>
           </a:xfrm>
           <a:prstGeom prst="rect">
             <a:avLst/>
           </a:prstGeom>
-          <a:noFill/>
+          <a:ln>
+            <a:noFill/>
+          </a:ln>
         </p:spPr>
-        <p:txBody>
-          <a:bodyPr wrap="square" rtlCol="0">
-            <a:spAutoFit/>
+        <p:style>
+          <a:lnRef idx="2">
+            <a:schemeClr val="accent1">
+              <a:shade val="50000"/>
+            </a:schemeClr>
+          </a:lnRef>
+          <a:fillRef idx="1">
+            <a:schemeClr val="accent1"/>
+          </a:fillRef>
+          <a:effectRef idx="0">
+            <a:schemeClr val="accent1"/>
+          </a:effectRef>
+          <a:fontRef idx="minor">
+            <a:schemeClr val="lt1"/>
+          </a:fontRef>
+        </p:style>
+        <p:txBody>
+          <a:bodyPr rtlCol="0" anchor="ctr"/>
+          <a:lstStyle/>
+          <a:p>
+            <a:pPr algn="ctr"/>
+            <a:endParaRPr lang="en-US"/>
+          </a:p>
+        </p:txBody>
+      </p:sp>
+      <p:sp>
+        <p:nvSpPr>
+          <p:cNvPr id="2" name="Title 1">
+            <a:extLst>
+              <a:ext uri="{FF2B5EF4-FFF2-40B4-BE49-F238E27FC236}">
+                <a16:creationId xmlns:a16="http://schemas.microsoft.com/office/drawing/2014/main" id="{2FF9F451-2D20-B35E-0075-0D192648B824}"/>
+              </a:ext>
+            </a:extLst>
+          </p:cNvPr>
+          <p:cNvSpPr>
+            <a:spLocks noGrp="1"/>
+          </p:cNvSpPr>
+          <p:nvPr>
+            <p:ph type="title"/>
+          </p:nvPr>
+        </p:nvSpPr>
+        <p:spPr>
+          <a:xfrm>
+            <a:off x="640080" y="325369"/>
+            <a:ext cx="4368602" cy="1956841"/>
+          </a:xfrm>
+        </p:spPr>
+        <p:txBody>
+          <a:bodyPr vert="horz" lIns="91440" tIns="45720" rIns="91440" bIns="45720" rtlCol="0" anchor="b">
+            <a:normAutofit/>
           </a:bodyPr>
+          <a:lstStyle/>
+          <a:p>
+            <a:r>
+              <a:rPr lang="en-US" sz="5400"/>
+              <a:t>Technologies</a:t>
+            </a:r>
+          </a:p>
+        </p:txBody>
+      </p:sp>
+      <p:sp>
+        <p:nvSpPr>
+          <p:cNvPr id="23" name="sketchy line">
+            <a:extLst>
+              <a:ext uri="{FF2B5EF4-FFF2-40B4-BE49-F238E27FC236}">
+                <a16:creationId xmlns:a16="http://schemas.microsoft.com/office/drawing/2014/main" id="{D4974D33-8DC5-464E-8C6D-BE58F0669C17}"/>
+              </a:ext>
+              <a:ext uri="{C183D7F6-B498-43B3-948B-1728B52AA6E4}">
+                <adec:decorative xmlns:adec="http://schemas.microsoft.com/office/drawing/2017/decorative" val="1"/>
+              </a:ext>
+            </a:extLst>
+          </p:cNvPr>
+          <p:cNvSpPr>
+            <a:spLocks noGrp="1" noRot="1" noChangeAspect="1" noMove="1" noResize="1" noEditPoints="1" noAdjustHandles="1" noChangeArrowheads="1" noChangeShapeType="1" noTextEdit="1"/>
+          </p:cNvSpPr>
+          <p:nvPr>
+            <p:extLst>
+              <p:ext uri="{386F3935-93C4-4BCD-93E2-E3B085C9AB24}">
+                <p16:designElem xmlns:p16="http://schemas.microsoft.com/office/powerpoint/2015/main" val="1"/>
+              </p:ext>
+            </p:extLst>
+          </p:nvPr>
+        </p:nvSpPr>
+        <p:spPr>
+          <a:xfrm>
+            <a:off x="640080" y="2586994"/>
+            <a:ext cx="3474720" cy="18288"/>
+          </a:xfrm>
+          <a:custGeom>
+            <a:avLst/>
+            <a:gdLst>
+              <a:gd name="connsiteX0" fmla="*/ 0 w 3474720"/>
+              <a:gd name="connsiteY0" fmla="*/ 0 h 18288"/>
+              <a:gd name="connsiteX1" fmla="*/ 694944 w 3474720"/>
+              <a:gd name="connsiteY1" fmla="*/ 0 h 18288"/>
+              <a:gd name="connsiteX2" fmla="*/ 1355141 w 3474720"/>
+              <a:gd name="connsiteY2" fmla="*/ 0 h 18288"/>
+              <a:gd name="connsiteX3" fmla="*/ 2015338 w 3474720"/>
+              <a:gd name="connsiteY3" fmla="*/ 0 h 18288"/>
+              <a:gd name="connsiteX4" fmla="*/ 2779776 w 3474720"/>
+              <a:gd name="connsiteY4" fmla="*/ 0 h 18288"/>
+              <a:gd name="connsiteX5" fmla="*/ 3474720 w 3474720"/>
+              <a:gd name="connsiteY5" fmla="*/ 0 h 18288"/>
+              <a:gd name="connsiteX6" fmla="*/ 3474720 w 3474720"/>
+              <a:gd name="connsiteY6" fmla="*/ 18288 h 18288"/>
+              <a:gd name="connsiteX7" fmla="*/ 2779776 w 3474720"/>
+              <a:gd name="connsiteY7" fmla="*/ 18288 h 18288"/>
+              <a:gd name="connsiteX8" fmla="*/ 2189074 w 3474720"/>
+              <a:gd name="connsiteY8" fmla="*/ 18288 h 18288"/>
+              <a:gd name="connsiteX9" fmla="*/ 1528877 w 3474720"/>
+              <a:gd name="connsiteY9" fmla="*/ 18288 h 18288"/>
+              <a:gd name="connsiteX10" fmla="*/ 868680 w 3474720"/>
+              <a:gd name="connsiteY10" fmla="*/ 18288 h 18288"/>
+              <a:gd name="connsiteX11" fmla="*/ 0 w 3474720"/>
+              <a:gd name="connsiteY11" fmla="*/ 18288 h 18288"/>
+              <a:gd name="connsiteX12" fmla="*/ 0 w 3474720"/>
+              <a:gd name="connsiteY12" fmla="*/ 0 h 18288"/>
+            </a:gdLst>
+            <a:ahLst/>
+            <a:cxnLst>
+              <a:cxn ang="0">
+                <a:pos x="connsiteX0" y="connsiteY0"/>
+              </a:cxn>
+              <a:cxn ang="0">
+                <a:pos x="connsiteX1" y="connsiteY1"/>
+              </a:cxn>
+              <a:cxn ang="0">
+                <a:pos x="connsiteX2" y="connsiteY2"/>
+              </a:cxn>
+              <a:cxn ang="0">
+                <a:pos x="connsiteX3" y="connsiteY3"/>
+              </a:cxn>
+              <a:cxn ang="0">
+                <a:pos x="connsiteX4" y="connsiteY4"/>
+              </a:cxn>
+              <a:cxn ang="0">
+                <a:pos x="connsiteX5" y="connsiteY5"/>
+              </a:cxn>
+              <a:cxn ang="0">
+                <a:pos x="connsiteX6" y="connsiteY6"/>
+              </a:cxn>
+              <a:cxn ang="0">
+                <a:pos x="connsiteX7" y="connsiteY7"/>
+              </a:cxn>
+              <a:cxn ang="0">
+                <a:pos x="connsiteX8" y="connsiteY8"/>
+              </a:cxn>
+              <a:cxn ang="0">
+                <a:pos x="connsiteX9" y="connsiteY9"/>
+              </a:cxn>
+              <a:cxn ang="0">
+                <a:pos x="connsiteX10" y="connsiteY10"/>
+              </a:cxn>
+              <a:cxn ang="0">
+                <a:pos x="connsiteX11" y="connsiteY11"/>
+              </a:cxn>
+              <a:cxn ang="0">
+                <a:pos x="connsiteX12" y="connsiteY12"/>
+              </a:cxn>
+            </a:cxnLst>
+            <a:rect l="l" t="t" r="r" b="b"/>
+            <a:pathLst>
+              <a:path w="3474720" h="18288" fill="none" extrusionOk="0">
+                <a:moveTo>
+                  <a:pt x="0" y="0"/>
+                </a:moveTo>
+                <a:cubicBezTo>
+                  <a:pt x="224454" y="-14544"/>
+                  <a:pt x="495407" y="26540"/>
+                  <a:pt x="694944" y="0"/>
+                </a:cubicBezTo>
+                <a:cubicBezTo>
+                  <a:pt x="894481" y="-26540"/>
+                  <a:pt x="1130063" y="24713"/>
+                  <a:pt x="1355141" y="0"/>
+                </a:cubicBezTo>
+                <a:cubicBezTo>
+                  <a:pt x="1580219" y="-24713"/>
+                  <a:pt x="1820099" y="26695"/>
+                  <a:pt x="2015338" y="0"/>
+                </a:cubicBezTo>
+                <a:cubicBezTo>
+                  <a:pt x="2210577" y="-26695"/>
+                  <a:pt x="2402045" y="165"/>
+                  <a:pt x="2779776" y="0"/>
+                </a:cubicBezTo>
+                <a:cubicBezTo>
+                  <a:pt x="3157507" y="-165"/>
+                  <a:pt x="3286859" y="-15571"/>
+                  <a:pt x="3474720" y="0"/>
+                </a:cubicBezTo>
+                <a:cubicBezTo>
+                  <a:pt x="3474286" y="7551"/>
+                  <a:pt x="3474253" y="9822"/>
+                  <a:pt x="3474720" y="18288"/>
+                </a:cubicBezTo>
+                <a:cubicBezTo>
+                  <a:pt x="3233904" y="29845"/>
+                  <a:pt x="2945134" y="-5256"/>
+                  <a:pt x="2779776" y="18288"/>
+                </a:cubicBezTo>
+                <a:cubicBezTo>
+                  <a:pt x="2614418" y="41832"/>
+                  <a:pt x="2339768" y="22709"/>
+                  <a:pt x="2189074" y="18288"/>
+                </a:cubicBezTo>
+                <a:cubicBezTo>
+                  <a:pt x="2038380" y="13867"/>
+                  <a:pt x="1817434" y="-4947"/>
+                  <a:pt x="1528877" y="18288"/>
+                </a:cubicBezTo>
+                <a:cubicBezTo>
+                  <a:pt x="1240320" y="41523"/>
+                  <a:pt x="1042447" y="37198"/>
+                  <a:pt x="868680" y="18288"/>
+                </a:cubicBezTo>
+                <a:cubicBezTo>
+                  <a:pt x="694913" y="-622"/>
+                  <a:pt x="233232" y="44909"/>
+                  <a:pt x="0" y="18288"/>
+                </a:cubicBezTo>
+                <a:cubicBezTo>
+                  <a:pt x="60" y="11696"/>
+                  <a:pt x="66" y="3758"/>
+                  <a:pt x="0" y="0"/>
+                </a:cubicBezTo>
+                <a:close/>
+              </a:path>
+              <a:path w="3474720" h="18288" stroke="0" extrusionOk="0">
+                <a:moveTo>
+                  <a:pt x="0" y="0"/>
+                </a:moveTo>
+                <a:cubicBezTo>
+                  <a:pt x="202328" y="-14716"/>
+                  <a:pt x="332722" y="-11499"/>
+                  <a:pt x="625450" y="0"/>
+                </a:cubicBezTo>
+                <a:cubicBezTo>
+                  <a:pt x="918178" y="11499"/>
+                  <a:pt x="1096688" y="5123"/>
+                  <a:pt x="1389888" y="0"/>
+                </a:cubicBezTo>
+                <a:cubicBezTo>
+                  <a:pt x="1683088" y="-5123"/>
+                  <a:pt x="1835981" y="-14038"/>
+                  <a:pt x="1980590" y="0"/>
+                </a:cubicBezTo>
+                <a:cubicBezTo>
+                  <a:pt x="2125199" y="14038"/>
+                  <a:pt x="2396099" y="-7203"/>
+                  <a:pt x="2571293" y="0"/>
+                </a:cubicBezTo>
+                <a:cubicBezTo>
+                  <a:pt x="2746487" y="7203"/>
+                  <a:pt x="3041609" y="-12036"/>
+                  <a:pt x="3474720" y="0"/>
+                </a:cubicBezTo>
+                <a:cubicBezTo>
+                  <a:pt x="3474638" y="4406"/>
+                  <a:pt x="3474631" y="9982"/>
+                  <a:pt x="3474720" y="18288"/>
+                </a:cubicBezTo>
+                <a:cubicBezTo>
+                  <a:pt x="3324873" y="21876"/>
+                  <a:pt x="3136771" y="12587"/>
+                  <a:pt x="2814523" y="18288"/>
+                </a:cubicBezTo>
+                <a:cubicBezTo>
+                  <a:pt x="2492275" y="23989"/>
+                  <a:pt x="2294402" y="47111"/>
+                  <a:pt x="2154326" y="18288"/>
+                </a:cubicBezTo>
+                <a:cubicBezTo>
+                  <a:pt x="2014250" y="-10535"/>
+                  <a:pt x="1820317" y="33903"/>
+                  <a:pt x="1494130" y="18288"/>
+                </a:cubicBezTo>
+                <a:cubicBezTo>
+                  <a:pt x="1167943" y="2673"/>
+                  <a:pt x="948432" y="14868"/>
+                  <a:pt x="729691" y="18288"/>
+                </a:cubicBezTo>
+                <a:cubicBezTo>
+                  <a:pt x="510950" y="21708"/>
+                  <a:pt x="264032" y="24354"/>
+                  <a:pt x="0" y="18288"/>
+                </a:cubicBezTo>
+                <a:cubicBezTo>
+                  <a:pt x="189" y="14288"/>
+                  <a:pt x="-703" y="3747"/>
+                  <a:pt x="0" y="0"/>
+                </a:cubicBezTo>
+                <a:close/>
+              </a:path>
+            </a:pathLst>
+          </a:custGeom>
+          <a:solidFill>
+            <a:schemeClr val="accent2"/>
+          </a:solidFill>
+          <a:ln w="44450" cap="rnd">
+            <a:solidFill>
+              <a:schemeClr val="accent2"/>
+            </a:solidFill>
+            <a:round/>
+            <a:extLst>
+              <a:ext uri="{C807C97D-BFC1-408E-A445-0C87EB9F89A2}">
+                <ask:lineSketchStyleProps xmlns:ask="http://schemas.microsoft.com/office/drawing/2018/sketchyshapes" sd="2863741219">
+                  <a:prstGeom prst="rect">
+                    <a:avLst/>
+                  </a:prstGeom>
+                  <ask:type>
+                    <ask:lineSketchFreehand/>
+                  </ask:type>
+                </ask:lineSketchStyleProps>
+              </a:ext>
+            </a:extLst>
+          </a:ln>
+        </p:spPr>
+        <p:style>
+          <a:lnRef idx="2">
+            <a:schemeClr val="accent1">
+              <a:shade val="50000"/>
+            </a:schemeClr>
+          </a:lnRef>
+          <a:fillRef idx="1">
+            <a:schemeClr val="accent1"/>
+          </a:fillRef>
+          <a:effectRef idx="0">
+            <a:schemeClr val="accent1"/>
+          </a:effectRef>
+          <a:fontRef idx="minor">
+            <a:schemeClr val="lt1"/>
+          </a:fontRef>
+        </p:style>
+        <p:txBody>
+          <a:bodyPr rtlCol="0" anchor="ctr"/>
+          <a:lstStyle/>
+          <a:p>
+            <a:pPr algn="ctr"/>
+            <a:endParaRPr lang="en-US"/>
+          </a:p>
+        </p:txBody>
+      </p:sp>
+      <p:sp>
+        <p:nvSpPr>
+          <p:cNvPr id="3" name="TextBox 2">
+            <a:extLst>
+              <a:ext uri="{FF2B5EF4-FFF2-40B4-BE49-F238E27FC236}">
+                <a16:creationId xmlns:a16="http://schemas.microsoft.com/office/drawing/2014/main" id="{E6636AC1-02C9-9AAE-9069-D14D1254A3C7}"/>
+              </a:ext>
+            </a:extLst>
+          </p:cNvPr>
+          <p:cNvSpPr txBox="1"/>
+          <p:nvPr/>
+        </p:nvSpPr>
+        <p:spPr>
+          <a:xfrm>
+            <a:off x="640080" y="2872899"/>
+            <a:ext cx="4243589" cy="3320668"/>
+          </a:xfrm>
+          <a:prstGeom prst="rect">
+            <a:avLst/>
+          </a:prstGeom>
+        </p:spPr>
+        <p:txBody>
+          <a:bodyPr vert="horz" lIns="91440" tIns="45720" rIns="91440" bIns="45720" rtlCol="0">
+            <a:normAutofit/>
+          </a:bodyPr>
+          <a:lstStyle/>
+          <a:p>
+            <a:pPr marL="285750" indent="-228600">
+              <a:lnSpc>
+                <a:spcPct val="90000"/>
+              </a:lnSpc>
+              <a:spcAft>
+                <a:spcPts val="600"/>
+              </a:spcAft>
+              <a:buFont typeface="Arial" panose="020B0604020202020204" pitchFamily="34" charset="0"/>
+              <a:buChar char="•"/>
+            </a:pPr>
+            <a:r>
+              <a:rPr lang="en-US" sz="2200"/>
+              <a:t>Python</a:t>
+            </a:r>
+          </a:p>
+          <a:p>
+            <a:pPr marL="285750" indent="-228600">
+              <a:lnSpc>
+                <a:spcPct val="90000"/>
+              </a:lnSpc>
+              <a:spcAft>
+                <a:spcPts val="600"/>
+              </a:spcAft>
+              <a:buFont typeface="Arial" panose="020B0604020202020204" pitchFamily="34" charset="0"/>
+              <a:buChar char="•"/>
+            </a:pPr>
+            <a:r>
+              <a:rPr lang="en-US" sz="2200"/>
+              <a:t>Discord / Discord Bot</a:t>
+            </a:r>
+          </a:p>
+          <a:p>
+            <a:pPr marL="285750" indent="-228600">
+              <a:lnSpc>
+                <a:spcPct val="90000"/>
+              </a:lnSpc>
+              <a:spcAft>
+                <a:spcPts val="600"/>
+              </a:spcAft>
+              <a:buFont typeface="Arial" panose="020B0604020202020204" pitchFamily="34" charset="0"/>
+              <a:buChar char="•"/>
+            </a:pPr>
+            <a:r>
+              <a:rPr lang="en-US" sz="2200"/>
+              <a:t>Replicate</a:t>
+            </a:r>
+          </a:p>
+          <a:p>
+            <a:pPr marL="285750" indent="-228600">
+              <a:lnSpc>
+                <a:spcPct val="90000"/>
+              </a:lnSpc>
+              <a:spcAft>
+                <a:spcPts val="600"/>
+              </a:spcAft>
+              <a:buFont typeface="Arial" panose="020B0604020202020204" pitchFamily="34" charset="0"/>
+              <a:buChar char="•"/>
+            </a:pPr>
+            <a:r>
+              <a:rPr lang="en-US" sz="2200"/>
+              <a:t>Whisper</a:t>
+            </a:r>
+          </a:p>
+          <a:p>
+            <a:pPr marL="285750" indent="-228600">
+              <a:lnSpc>
+                <a:spcPct val="90000"/>
+              </a:lnSpc>
+              <a:spcAft>
+                <a:spcPts val="600"/>
+              </a:spcAft>
+              <a:buFont typeface="Arial" panose="020B0604020202020204" pitchFamily="34" charset="0"/>
+              <a:buChar char="•"/>
+            </a:pPr>
+            <a:r>
+              <a:rPr lang="en-US" sz="2200"/>
+              <a:t>Llama ? </a:t>
+            </a:r>
+          </a:p>
+          <a:p>
+            <a:pPr marL="285750" indent="-228600">
+              <a:lnSpc>
+                <a:spcPct val="90000"/>
+              </a:lnSpc>
+              <a:spcAft>
+                <a:spcPts val="600"/>
+              </a:spcAft>
+              <a:buFont typeface="Arial" panose="020B0604020202020204" pitchFamily="34" charset="0"/>
+              <a:buChar char="•"/>
+            </a:pPr>
+            <a:r>
+              <a:rPr lang="en-US" sz="2200"/>
+              <a:t>Picture Model?</a:t>
+            </a:r>
+          </a:p>
+        </p:txBody>
+      </p:sp>
+      <p:pic>
+        <p:nvPicPr>
+          <p:cNvPr id="5" name="Picture 4" descr="A blue circuit board with light rays&#10;&#10;Description automatically generated">
+            <a:extLst>
+              <a:ext uri="{FF2B5EF4-FFF2-40B4-BE49-F238E27FC236}">
+                <a16:creationId xmlns:a16="http://schemas.microsoft.com/office/drawing/2014/main" id="{41CDFC27-B333-A1AE-CA89-9FE88A57F20A}"/>
+              </a:ext>
+            </a:extLst>
+          </p:cNvPr>
+          <p:cNvPicPr>
+            <a:picLocks noChangeAspect="1"/>
+          </p:cNvPicPr>
+          <p:nvPr/>
+        </p:nvPicPr>
+        <p:blipFill>
+          <a:blip r:embed="rId2">
+            <a:extLst>
+              <a:ext uri="{28A0092B-C50C-407E-A947-70E740481C1C}">
+                <a14:useLocalDpi xmlns:a14="http://schemas.microsoft.com/office/drawing/2010/main" val="0"/>
+              </a:ext>
+            </a:extLst>
+          </a:blip>
+          <a:srcRect l="19232" r="24347"/>
+          <a:stretch/>
+        </p:blipFill>
+        <p:spPr>
+          <a:xfrm>
+            <a:off x="5311702" y="10"/>
+            <a:ext cx="6878775" cy="6857990"/>
+          </a:xfrm>
+          <a:custGeom>
+            <a:avLst/>
+            <a:gdLst/>
+            <a:ahLst/>
+            <a:cxnLst/>
+            <a:rect l="l" t="t" r="r" b="b"/>
+            <a:pathLst>
+              <a:path w="6878775" h="6858000">
+                <a:moveTo>
+                  <a:pt x="1102973" y="0"/>
+                </a:moveTo>
+                <a:lnTo>
+                  <a:pt x="1160688" y="0"/>
+                </a:lnTo>
+                <a:lnTo>
+                  <a:pt x="983189" y="331786"/>
+                </a:lnTo>
+                <a:cubicBezTo>
+                  <a:pt x="914866" y="469145"/>
+                  <a:pt x="850355" y="608712"/>
+                  <a:pt x="789261" y="750263"/>
+                </a:cubicBezTo>
+                <a:cubicBezTo>
+                  <a:pt x="774307" y="784928"/>
+                  <a:pt x="759992" y="819849"/>
+                  <a:pt x="745295" y="854514"/>
+                </a:cubicBezTo>
+                <a:cubicBezTo>
+                  <a:pt x="756682" y="845393"/>
+                  <a:pt x="765489" y="833492"/>
+                  <a:pt x="770857" y="819975"/>
+                </a:cubicBezTo>
+                <a:cubicBezTo>
+                  <a:pt x="879943" y="589569"/>
+                  <a:pt x="999605" y="365513"/>
+                  <a:pt x="1131329" y="148742"/>
+                </a:cubicBezTo>
+                <a:lnTo>
+                  <a:pt x="1227589" y="0"/>
+                </a:lnTo>
+                <a:lnTo>
+                  <a:pt x="6878775" y="0"/>
+                </a:lnTo>
+                <a:lnTo>
+                  <a:pt x="6878775" y="6858000"/>
+                </a:lnTo>
+                <a:lnTo>
+                  <a:pt x="713521" y="6858000"/>
+                </a:lnTo>
+                <a:lnTo>
+                  <a:pt x="625642" y="6670527"/>
+                </a:lnTo>
+                <a:cubicBezTo>
+                  <a:pt x="507232" y="6398531"/>
+                  <a:pt x="403083" y="6118381"/>
+                  <a:pt x="312785" y="5830359"/>
+                </a:cubicBezTo>
+                <a:cubicBezTo>
+                  <a:pt x="278149" y="5719759"/>
+                  <a:pt x="248879" y="5607635"/>
+                  <a:pt x="212198" y="5480401"/>
+                </a:cubicBezTo>
+                <a:cubicBezTo>
+                  <a:pt x="212208" y="5491601"/>
+                  <a:pt x="212803" y="5502788"/>
+                  <a:pt x="213988" y="5513923"/>
+                </a:cubicBezTo>
+                <a:cubicBezTo>
+                  <a:pt x="264089" y="5723695"/>
+                  <a:pt x="307290" y="5935370"/>
+                  <a:pt x="365826" y="6142729"/>
+                </a:cubicBezTo>
+                <a:cubicBezTo>
+                  <a:pt x="433152" y="6380817"/>
+                  <a:pt x="510068" y="6614016"/>
+                  <a:pt x="597975" y="6841549"/>
+                </a:cubicBezTo>
+                <a:lnTo>
+                  <a:pt x="604824" y="6858000"/>
+                </a:lnTo>
+                <a:lnTo>
+                  <a:pt x="552056" y="6858000"/>
+                </a:lnTo>
+                <a:lnTo>
+                  <a:pt x="539576" y="6828295"/>
+                </a:lnTo>
+                <a:cubicBezTo>
+                  <a:pt x="380597" y="6414594"/>
+                  <a:pt x="260223" y="5988893"/>
+                  <a:pt x="171555" y="5552906"/>
+                </a:cubicBezTo>
+                <a:cubicBezTo>
+                  <a:pt x="91163" y="5157998"/>
+                  <a:pt x="43746" y="4758899"/>
+                  <a:pt x="12305" y="4357388"/>
+                </a:cubicBezTo>
+                <a:cubicBezTo>
+                  <a:pt x="-14281" y="4013908"/>
+                  <a:pt x="4507" y="3672965"/>
+                  <a:pt x="46684" y="3331516"/>
+                </a:cubicBezTo>
+                <a:cubicBezTo>
+                  <a:pt x="127203" y="2664286"/>
+                  <a:pt x="277819" y="2007265"/>
+                  <a:pt x="496065" y="1371196"/>
+                </a:cubicBezTo>
+                <a:cubicBezTo>
+                  <a:pt x="636273" y="966066"/>
+                  <a:pt x="800445" y="573253"/>
+                  <a:pt x="995723" y="196614"/>
+                </a:cubicBezTo>
+                <a:close/>
+              </a:path>
+            </a:pathLst>
+          </a:custGeom>
+        </p:spPr>
+      </p:pic>
+    </p:spTree>
+    <p:extLst>
+      <p:ext uri="{BB962C8B-B14F-4D97-AF65-F5344CB8AC3E}">
+        <p14:creationId xmlns:p14="http://schemas.microsoft.com/office/powerpoint/2010/main" val="947249045"/>
+      </p:ext>
+    </p:extLst>
+  </p:cSld>
+  <p:clrMapOvr>
+    <a:masterClrMapping/>
+  </p:clrMapOvr>
+</p:sld>
+</file>
+
+<file path=ppt/slides/slide4.xml><?xml version="1.0" encoding="utf-8"?>
+<p:sld xmlns:a="http://schemas.openxmlformats.org/drawingml/2006/main" xmlns:r="http://schemas.openxmlformats.org/officeDocument/2006/relationships" xmlns:p="http://schemas.openxmlformats.org/presentationml/2006/main">
+  <p:cSld>
+    <p:spTree>
+      <p:nvGrpSpPr>
+        <p:cNvPr id="1" name=""/>
+        <p:cNvGrpSpPr/>
+        <p:nvPr/>
+      </p:nvGrpSpPr>
+      <p:grpSpPr>
+        <a:xfrm>
+          <a:off x="0" y="0"/>
+          <a:ext cx="0" cy="0"/>
+          <a:chOff x="0" y="0"/>
+          <a:chExt cx="0" cy="0"/>
+        </a:xfrm>
+      </p:grpSpPr>
+      <p:sp>
+        <p:nvSpPr>
+          <p:cNvPr id="2" name="Title 1">
+            <a:extLst>
+              <a:ext uri="{FF2B5EF4-FFF2-40B4-BE49-F238E27FC236}">
+                <a16:creationId xmlns:a16="http://schemas.microsoft.com/office/drawing/2014/main" id="{ED2D5CA7-691A-7706-B78C-F8F8D03632CD}"/>
+              </a:ext>
+            </a:extLst>
+          </p:cNvPr>
+          <p:cNvSpPr>
+            <a:spLocks noGrp="1"/>
+          </p:cNvSpPr>
+          <p:nvPr>
+            <p:ph type="title"/>
+          </p:nvPr>
+        </p:nvSpPr>
+        <p:spPr/>
+        <p:txBody>
+          <a:bodyPr/>
+          <a:lstStyle/>
+          <a:p>
+            <a:r>
+              <a:rPr lang="de-CH" dirty="0"/>
+              <a:t>Problems &amp; Solutions</a:t>
+            </a:r>
+          </a:p>
+        </p:txBody>
+      </p:sp>
+      <p:sp>
+        <p:nvSpPr>
+          <p:cNvPr id="3" name="Text Placeholder 2">
+            <a:extLst>
+              <a:ext uri="{FF2B5EF4-FFF2-40B4-BE49-F238E27FC236}">
+                <a16:creationId xmlns:a16="http://schemas.microsoft.com/office/drawing/2014/main" id="{38BA2A23-4E93-F4C8-5C30-C79D15311580}"/>
+              </a:ext>
+            </a:extLst>
+          </p:cNvPr>
+          <p:cNvSpPr>
+            <a:spLocks noGrp="1"/>
+          </p:cNvSpPr>
+          <p:nvPr>
+            <p:ph type="body" idx="1"/>
+          </p:nvPr>
+        </p:nvSpPr>
+        <p:spPr/>
+        <p:txBody>
+          <a:bodyPr/>
+          <a:lstStyle/>
+          <a:p>
+            <a:r>
+              <a:rPr lang="de-CH" dirty="0"/>
+              <a:t>Problems</a:t>
+            </a:r>
+          </a:p>
+        </p:txBody>
+      </p:sp>
+      <p:sp>
+        <p:nvSpPr>
+          <p:cNvPr id="4" name="Content Placeholder 3">
+            <a:extLst>
+              <a:ext uri="{FF2B5EF4-FFF2-40B4-BE49-F238E27FC236}">
+                <a16:creationId xmlns:a16="http://schemas.microsoft.com/office/drawing/2014/main" id="{F5409433-1A18-E9F3-FA71-62675CA10219}"/>
+              </a:ext>
+            </a:extLst>
+          </p:cNvPr>
+          <p:cNvSpPr>
+            <a:spLocks noGrp="1"/>
+          </p:cNvSpPr>
+          <p:nvPr>
+            <p:ph sz="half" idx="2"/>
+          </p:nvPr>
+        </p:nvSpPr>
+        <p:spPr/>
+        <p:txBody>
+          <a:bodyPr/>
+          <a:lstStyle/>
+          <a:p>
+            <a:r>
+              <a:rPr lang="de-CH" dirty="0"/>
+              <a:t>Continuous Recording</a:t>
+            </a:r>
+          </a:p>
+          <a:p>
+            <a:r>
+              <a:rPr lang="de-CH" dirty="0"/>
+              <a:t>Good Prompts</a:t>
+            </a:r>
+          </a:p>
+          <a:p>
+            <a:r>
+              <a:rPr lang="de-CH" dirty="0"/>
+              <a:t>Who Spoke?</a:t>
+            </a:r>
+          </a:p>
+          <a:p>
+            <a:r>
+              <a:rPr lang="de-CH" dirty="0"/>
+              <a:t>Time Delays</a:t>
+            </a:r>
+          </a:p>
+        </p:txBody>
+      </p:sp>
+      <p:sp>
+        <p:nvSpPr>
+          <p:cNvPr id="5" name="Text Placeholder 4">
+            <a:extLst>
+              <a:ext uri="{FF2B5EF4-FFF2-40B4-BE49-F238E27FC236}">
+                <a16:creationId xmlns:a16="http://schemas.microsoft.com/office/drawing/2014/main" id="{7E50D9F6-0BE5-2427-C5B8-BE2533C1CE78}"/>
+              </a:ext>
+            </a:extLst>
+          </p:cNvPr>
+          <p:cNvSpPr>
+            <a:spLocks noGrp="1"/>
+          </p:cNvSpPr>
+          <p:nvPr>
+            <p:ph type="body" sz="quarter" idx="3"/>
+          </p:nvPr>
+        </p:nvSpPr>
+        <p:spPr/>
+        <p:txBody>
+          <a:bodyPr/>
+          <a:lstStyle/>
+          <a:p>
+            <a:r>
+              <a:rPr lang="de-CH" dirty="0"/>
+              <a:t>Solutions</a:t>
+            </a:r>
+          </a:p>
+        </p:txBody>
+      </p:sp>
+      <p:sp>
+        <p:nvSpPr>
+          <p:cNvPr id="6" name="Content Placeholder 5">
+            <a:extLst>
+              <a:ext uri="{FF2B5EF4-FFF2-40B4-BE49-F238E27FC236}">
+                <a16:creationId xmlns:a16="http://schemas.microsoft.com/office/drawing/2014/main" id="{E5B89CE9-D98F-9AA5-C48E-498B16CD7AB3}"/>
+              </a:ext>
+            </a:extLst>
+          </p:cNvPr>
+          <p:cNvSpPr>
+            <a:spLocks noGrp="1"/>
+          </p:cNvSpPr>
+          <p:nvPr>
+            <p:ph sz="quarter" idx="4"/>
+          </p:nvPr>
+        </p:nvSpPr>
+        <p:spPr/>
+        <p:txBody>
+          <a:bodyPr/>
+          <a:lstStyle/>
+          <a:p>
+            <a:r>
+              <a:rPr lang="de-CH" dirty="0"/>
+              <a:t>Cut up Conversation</a:t>
+            </a:r>
+          </a:p>
+          <a:p>
+            <a:r>
+              <a:rPr lang="de-CH" dirty="0"/>
+              <a:t>Using LLM to create Prompt</a:t>
+            </a:r>
+          </a:p>
+          <a:p>
+            <a:r>
+              <a:rPr lang="de-CH" dirty="0"/>
+              <a:t>Discord speaker Identification</a:t>
+            </a:r>
+          </a:p>
+          <a:p>
+            <a:r>
+              <a:rPr lang="de-CH" dirty="0"/>
+              <a:t>Slow Game </a:t>
+            </a:r>
+            <a:r>
+              <a:rPr lang="de-CH" dirty="0">
+                <a:sym typeface="Wingdings" panose="05000000000000000000" pitchFamily="2" charset="2"/>
+              </a:rPr>
+              <a:t> No Time pressure</a:t>
+            </a:r>
+            <a:endParaRPr lang="de-CH" dirty="0"/>
+          </a:p>
+        </p:txBody>
+      </p:sp>
+    </p:spTree>
+    <p:extLst>
+      <p:ext uri="{BB962C8B-B14F-4D97-AF65-F5344CB8AC3E}">
+        <p14:creationId xmlns:p14="http://schemas.microsoft.com/office/powerpoint/2010/main" val="1209807793"/>
+      </p:ext>
+    </p:extLst>
+  </p:cSld>
+  <p:clrMapOvr>
+    <a:masterClrMapping/>
+  </p:clrMapOvr>
+</p:sld>
+</file>
+
+<file path=ppt/slides/slide5.xml><?xml version="1.0" encoding="utf-8"?>
+<p:sld xmlns:a="http://schemas.openxmlformats.org/drawingml/2006/main" xmlns:r="http://schemas.openxmlformats.org/officeDocument/2006/relationships" xmlns:p="http://schemas.openxmlformats.org/presentationml/2006/main">
+  <p:cSld>
+    <p:spTree>
+      <p:nvGrpSpPr>
+        <p:cNvPr id="1" name=""/>
+        <p:cNvGrpSpPr/>
+        <p:nvPr/>
+      </p:nvGrpSpPr>
+      <p:grpSpPr>
+        <a:xfrm>
+          <a:off x="0" y="0"/>
+          <a:ext cx="0" cy="0"/>
+          <a:chOff x="0" y="0"/>
+          <a:chExt cx="0" cy="0"/>
+        </a:xfrm>
+      </p:grpSpPr>
+      <p:sp>
+        <p:nvSpPr>
+          <p:cNvPr id="2" name="Title 1">
+            <a:extLst>
+              <a:ext uri="{FF2B5EF4-FFF2-40B4-BE49-F238E27FC236}">
+                <a16:creationId xmlns:a16="http://schemas.microsoft.com/office/drawing/2014/main" id="{DFFB5C54-EE53-50D5-C799-4A9B523EE67A}"/>
+              </a:ext>
+            </a:extLst>
+          </p:cNvPr>
+          <p:cNvSpPr>
+            <a:spLocks noGrp="1"/>
+          </p:cNvSpPr>
+          <p:nvPr>
+            <p:ph type="title"/>
+          </p:nvPr>
+        </p:nvSpPr>
+        <p:spPr/>
+        <p:txBody>
+          <a:bodyPr/>
+          <a:lstStyle/>
+          <a:p>
+            <a:r>
+              <a:rPr lang="de-CH" dirty="0"/>
+              <a:t>Current State</a:t>
+            </a:r>
+          </a:p>
+        </p:txBody>
+      </p:sp>
+      <p:pic>
+        <p:nvPicPr>
+          <p:cNvPr id="8" name="Content Placeholder 7" descr="A yellow sign with black text&#10;&#10;Description automatically generated">
+            <a:extLst>
+              <a:ext uri="{FF2B5EF4-FFF2-40B4-BE49-F238E27FC236}">
+                <a16:creationId xmlns:a16="http://schemas.microsoft.com/office/drawing/2014/main" id="{5408BB56-97FA-6B77-0FB9-A2883337A21A}"/>
+              </a:ext>
+            </a:extLst>
+          </p:cNvPr>
+          <p:cNvPicPr>
+            <a:picLocks noGrp="1" noChangeAspect="1"/>
+          </p:cNvPicPr>
+          <p:nvPr>
+            <p:ph idx="1"/>
+          </p:nvPr>
+        </p:nvPicPr>
+        <p:blipFill>
+          <a:blip r:embed="rId2">
+            <a:extLst>
+              <a:ext uri="{28A0092B-C50C-407E-A947-70E740481C1C}">
+                <a14:useLocalDpi xmlns:a14="http://schemas.microsoft.com/office/drawing/2010/main" val="0"/>
+              </a:ext>
+            </a:extLst>
+          </a:blip>
+          <a:stretch>
+            <a:fillRect/>
+          </a:stretch>
+        </p:blipFill>
+        <p:spPr>
+          <a:xfrm>
+            <a:off x="5276788" y="1849272"/>
+            <a:ext cx="5678405" cy="3524527"/>
+          </a:xfrm>
+        </p:spPr>
+      </p:pic>
+      <p:sp>
+        <p:nvSpPr>
+          <p:cNvPr id="4" name="Text Placeholder 3">
+            <a:extLst>
+              <a:ext uri="{FF2B5EF4-FFF2-40B4-BE49-F238E27FC236}">
+                <a16:creationId xmlns:a16="http://schemas.microsoft.com/office/drawing/2014/main" id="{CADF340D-177E-E77D-3790-24598A983143}"/>
+              </a:ext>
+            </a:extLst>
+          </p:cNvPr>
+          <p:cNvSpPr>
+            <a:spLocks noGrp="1"/>
+          </p:cNvSpPr>
+          <p:nvPr>
+            <p:ph type="body" sz="half" idx="2"/>
+          </p:nvPr>
+        </p:nvSpPr>
+        <p:spPr>
+          <a:xfrm>
+            <a:off x="839788" y="2057400"/>
+            <a:ext cx="3932237" cy="1157288"/>
+          </a:xfrm>
+        </p:spPr>
+        <p:txBody>
+          <a:bodyPr/>
           <a:lstStyle/>
           <a:p>
             <a:pPr marL="285750" indent="-285750">
@@ -3670,7 +5369,7 @@
             </a:pPr>
             <a:r>
               <a:rPr lang="de-CH" dirty="0"/>
-              <a:t>Python</a:t>
+              <a:t>Discord Bot</a:t>
             </a:r>
           </a:p>
           <a:p>
@@ -3680,7 +5379,7 @@
             </a:pPr>
             <a:r>
               <a:rPr lang="de-CH" dirty="0"/>
-              <a:t>Discord / Discord Bot</a:t>
+              <a:t>Recording</a:t>
             </a:r>
           </a:p>
           <a:p>
@@ -3690,9 +5389,256 @@
             </a:pPr>
             <a:r>
               <a:rPr lang="de-CH" dirty="0"/>
-              <a:t>Replicate</a:t>
-            </a:r>
-          </a:p>
+              <a:t>Speech To Text</a:t>
+            </a:r>
+          </a:p>
+        </p:txBody>
+      </p:sp>
+      <p:sp>
+        <p:nvSpPr>
+          <p:cNvPr id="5" name="Title 1">
+            <a:extLst>
+              <a:ext uri="{FF2B5EF4-FFF2-40B4-BE49-F238E27FC236}">
+                <a16:creationId xmlns:a16="http://schemas.microsoft.com/office/drawing/2014/main" id="{AA6398B2-2C18-E78A-9E12-54C18F6981F1}"/>
+              </a:ext>
+            </a:extLst>
+          </p:cNvPr>
+          <p:cNvSpPr txBox="1">
+            <a:spLocks/>
+          </p:cNvSpPr>
+          <p:nvPr/>
+        </p:nvSpPr>
+        <p:spPr>
+          <a:xfrm>
+            <a:off x="842963" y="2400300"/>
+            <a:ext cx="3932237" cy="1600200"/>
+          </a:xfrm>
+          <a:prstGeom prst="rect">
+            <a:avLst/>
+          </a:prstGeom>
+        </p:spPr>
+        <p:txBody>
+          <a:bodyPr vert="horz" lIns="91440" tIns="45720" rIns="91440" bIns="45720" rtlCol="0" anchor="b">
+            <a:normAutofit/>
+          </a:bodyPr>
+          <a:lstStyle>
+            <a:lvl1pPr algn="l" defTabSz="914400" rtl="0" eaLnBrk="1" latinLnBrk="0" hangingPunct="1">
+              <a:lnSpc>
+                <a:spcPct val="90000"/>
+              </a:lnSpc>
+              <a:spcBef>
+                <a:spcPct val="0"/>
+              </a:spcBef>
+              <a:buNone/>
+              <a:defRPr sz="3200" kern="1200">
+                <a:solidFill>
+                  <a:schemeClr val="tx1"/>
+                </a:solidFill>
+                <a:latin typeface="+mj-lt"/>
+                <a:ea typeface="+mj-ea"/>
+                <a:cs typeface="+mj-cs"/>
+              </a:defRPr>
+            </a:lvl1pPr>
+          </a:lstStyle>
+          <a:p>
+            <a:r>
+              <a:rPr lang="de-CH" dirty="0"/>
+              <a:t>Whats Next</a:t>
+            </a:r>
+          </a:p>
+        </p:txBody>
+      </p:sp>
+      <p:sp>
+        <p:nvSpPr>
+          <p:cNvPr id="6" name="Text Placeholder 3">
+            <a:extLst>
+              <a:ext uri="{FF2B5EF4-FFF2-40B4-BE49-F238E27FC236}">
+                <a16:creationId xmlns:a16="http://schemas.microsoft.com/office/drawing/2014/main" id="{8DD4D689-F26D-273A-2120-2080E41FF714}"/>
+              </a:ext>
+            </a:extLst>
+          </p:cNvPr>
+          <p:cNvSpPr txBox="1">
+            <a:spLocks/>
+          </p:cNvSpPr>
+          <p:nvPr/>
+        </p:nvSpPr>
+        <p:spPr>
+          <a:xfrm>
+            <a:off x="836612" y="4000500"/>
+            <a:ext cx="3932237" cy="1860550"/>
+          </a:xfrm>
+          <a:prstGeom prst="rect">
+            <a:avLst/>
+          </a:prstGeom>
+        </p:spPr>
+        <p:txBody>
+          <a:bodyPr vert="horz" lIns="91440" tIns="45720" rIns="91440" bIns="45720" rtlCol="0">
+            <a:normAutofit/>
+          </a:bodyPr>
+          <a:lstStyle>
+            <a:lvl1pPr marL="0" indent="0" algn="l" defTabSz="914400" rtl="0" eaLnBrk="1" latinLnBrk="0" hangingPunct="1">
+              <a:lnSpc>
+                <a:spcPct val="90000"/>
+              </a:lnSpc>
+              <a:spcBef>
+                <a:spcPts val="1000"/>
+              </a:spcBef>
+              <a:buFont typeface="Arial" panose="020B0604020202020204" pitchFamily="34" charset="0"/>
+              <a:buNone/>
+              <a:defRPr sz="1600" kern="1200">
+                <a:solidFill>
+                  <a:schemeClr val="tx1"/>
+                </a:solidFill>
+                <a:latin typeface="+mn-lt"/>
+                <a:ea typeface="+mn-ea"/>
+                <a:cs typeface="+mn-cs"/>
+              </a:defRPr>
+            </a:lvl1pPr>
+            <a:lvl2pPr marL="457200" indent="0" algn="l" defTabSz="914400" rtl="0" eaLnBrk="1" latinLnBrk="0" hangingPunct="1">
+              <a:lnSpc>
+                <a:spcPct val="90000"/>
+              </a:lnSpc>
+              <a:spcBef>
+                <a:spcPts val="500"/>
+              </a:spcBef>
+              <a:buFont typeface="Arial" panose="020B0604020202020204" pitchFamily="34" charset="0"/>
+              <a:buNone/>
+              <a:defRPr sz="1400" kern="1200">
+                <a:solidFill>
+                  <a:schemeClr val="tx1"/>
+                </a:solidFill>
+                <a:latin typeface="+mn-lt"/>
+                <a:ea typeface="+mn-ea"/>
+                <a:cs typeface="+mn-cs"/>
+              </a:defRPr>
+            </a:lvl2pPr>
+            <a:lvl3pPr marL="914400" indent="0" algn="l" defTabSz="914400" rtl="0" eaLnBrk="1" latinLnBrk="0" hangingPunct="1">
+              <a:lnSpc>
+                <a:spcPct val="90000"/>
+              </a:lnSpc>
+              <a:spcBef>
+                <a:spcPts val="500"/>
+              </a:spcBef>
+              <a:buFont typeface="Arial" panose="020B0604020202020204" pitchFamily="34" charset="0"/>
+              <a:buNone/>
+              <a:defRPr sz="1200" kern="1200">
+                <a:solidFill>
+                  <a:schemeClr val="tx1"/>
+                </a:solidFill>
+                <a:latin typeface="+mn-lt"/>
+                <a:ea typeface="+mn-ea"/>
+                <a:cs typeface="+mn-cs"/>
+              </a:defRPr>
+            </a:lvl3pPr>
+            <a:lvl4pPr marL="1371600" indent="0" algn="l" defTabSz="914400" rtl="0" eaLnBrk="1" latinLnBrk="0" hangingPunct="1">
+              <a:lnSpc>
+                <a:spcPct val="90000"/>
+              </a:lnSpc>
+              <a:spcBef>
+                <a:spcPts val="500"/>
+              </a:spcBef>
+              <a:buFont typeface="Arial" panose="020B0604020202020204" pitchFamily="34" charset="0"/>
+              <a:buNone/>
+              <a:defRPr sz="1000" kern="1200">
+                <a:solidFill>
+                  <a:schemeClr val="tx1"/>
+                </a:solidFill>
+                <a:latin typeface="+mn-lt"/>
+                <a:ea typeface="+mn-ea"/>
+                <a:cs typeface="+mn-cs"/>
+              </a:defRPr>
+            </a:lvl4pPr>
+            <a:lvl5pPr marL="1828800" indent="0" algn="l" defTabSz="914400" rtl="0" eaLnBrk="1" latinLnBrk="0" hangingPunct="1">
+              <a:lnSpc>
+                <a:spcPct val="90000"/>
+              </a:lnSpc>
+              <a:spcBef>
+                <a:spcPts val="500"/>
+              </a:spcBef>
+              <a:buFont typeface="Arial" panose="020B0604020202020204" pitchFamily="34" charset="0"/>
+              <a:buNone/>
+              <a:defRPr sz="1000" kern="1200">
+                <a:solidFill>
+                  <a:schemeClr val="tx1"/>
+                </a:solidFill>
+                <a:latin typeface="+mn-lt"/>
+                <a:ea typeface="+mn-ea"/>
+                <a:cs typeface="+mn-cs"/>
+              </a:defRPr>
+            </a:lvl5pPr>
+            <a:lvl6pPr marL="2286000" indent="0" algn="l" defTabSz="914400" rtl="0" eaLnBrk="1" latinLnBrk="0" hangingPunct="1">
+              <a:lnSpc>
+                <a:spcPct val="90000"/>
+              </a:lnSpc>
+              <a:spcBef>
+                <a:spcPts val="500"/>
+              </a:spcBef>
+              <a:buFont typeface="Arial" panose="020B0604020202020204" pitchFamily="34" charset="0"/>
+              <a:buNone/>
+              <a:defRPr sz="1000" kern="1200">
+                <a:solidFill>
+                  <a:schemeClr val="tx1"/>
+                </a:solidFill>
+                <a:latin typeface="+mn-lt"/>
+                <a:ea typeface="+mn-ea"/>
+                <a:cs typeface="+mn-cs"/>
+              </a:defRPr>
+            </a:lvl6pPr>
+            <a:lvl7pPr marL="2743200" indent="0" algn="l" defTabSz="914400" rtl="0" eaLnBrk="1" latinLnBrk="0" hangingPunct="1">
+              <a:lnSpc>
+                <a:spcPct val="90000"/>
+              </a:lnSpc>
+              <a:spcBef>
+                <a:spcPts val="500"/>
+              </a:spcBef>
+              <a:buFont typeface="Arial" panose="020B0604020202020204" pitchFamily="34" charset="0"/>
+              <a:buNone/>
+              <a:defRPr sz="1000" kern="1200">
+                <a:solidFill>
+                  <a:schemeClr val="tx1"/>
+                </a:solidFill>
+                <a:latin typeface="+mn-lt"/>
+                <a:ea typeface="+mn-ea"/>
+                <a:cs typeface="+mn-cs"/>
+              </a:defRPr>
+            </a:lvl7pPr>
+            <a:lvl8pPr marL="3200400" indent="0" algn="l" defTabSz="914400" rtl="0" eaLnBrk="1" latinLnBrk="0" hangingPunct="1">
+              <a:lnSpc>
+                <a:spcPct val="90000"/>
+              </a:lnSpc>
+              <a:spcBef>
+                <a:spcPts val="500"/>
+              </a:spcBef>
+              <a:buFont typeface="Arial" panose="020B0604020202020204" pitchFamily="34" charset="0"/>
+              <a:buNone/>
+              <a:defRPr sz="1000" kern="1200">
+                <a:solidFill>
+                  <a:schemeClr val="tx1"/>
+                </a:solidFill>
+                <a:latin typeface="+mn-lt"/>
+                <a:ea typeface="+mn-ea"/>
+                <a:cs typeface="+mn-cs"/>
+              </a:defRPr>
+            </a:lvl8pPr>
+            <a:lvl9pPr marL="3657600" indent="0" algn="l" defTabSz="914400" rtl="0" eaLnBrk="1" latinLnBrk="0" hangingPunct="1">
+              <a:lnSpc>
+                <a:spcPct val="90000"/>
+              </a:lnSpc>
+              <a:spcBef>
+                <a:spcPts val="500"/>
+              </a:spcBef>
+              <a:buFont typeface="Arial" panose="020B0604020202020204" pitchFamily="34" charset="0"/>
+              <a:buNone/>
+              <a:defRPr sz="1000" kern="1200">
+                <a:solidFill>
+                  <a:schemeClr val="tx1"/>
+                </a:solidFill>
+                <a:latin typeface="+mn-lt"/>
+                <a:ea typeface="+mn-ea"/>
+                <a:cs typeface="+mn-cs"/>
+              </a:defRPr>
+            </a:lvl9pPr>
+          </a:lstStyle>
           <a:p>
             <a:pPr marL="285750" indent="-285750">
               <a:buFont typeface="Arial" panose="020B0604020202020204" pitchFamily="34" charset="0"/>
@@ -3700,7 +5646,7 @@
             </a:pPr>
             <a:r>
               <a:rPr lang="de-CH" dirty="0"/>
-              <a:t>Whisper</a:t>
+              <a:t>Cut up Recording</a:t>
             </a:r>
           </a:p>
           <a:p>
@@ -3710,7 +5656,7 @@
             </a:pPr>
             <a:r>
               <a:rPr lang="de-CH" dirty="0"/>
-              <a:t>Llama ? </a:t>
+              <a:t>Improving Speech to text</a:t>
             </a:r>
           </a:p>
           <a:p>
@@ -3720,7 +5666,27 @@
             </a:pPr>
             <a:r>
               <a:rPr lang="de-CH" dirty="0"/>
-              <a:t>Picture Model?</a:t>
+              <a:t>Implement LLM</a:t>
+            </a:r>
+          </a:p>
+          <a:p>
+            <a:pPr marL="285750" indent="-285750">
+              <a:buFont typeface="Arial" panose="020B0604020202020204" pitchFamily="34" charset="0"/>
+              <a:buChar char="•"/>
+            </a:pPr>
+            <a:r>
+              <a:rPr lang="de-CH" dirty="0"/>
+              <a:t>Feed LLM Promt to Picture Model</a:t>
+            </a:r>
+          </a:p>
+          <a:p>
+            <a:pPr marL="285750" indent="-285750">
+              <a:buFont typeface="Arial" panose="020B0604020202020204" pitchFamily="34" charset="0"/>
+              <a:buChar char="•"/>
+            </a:pPr>
+            <a:r>
+              <a:rPr lang="de-CH" dirty="0"/>
+              <a:t>Display Pictures</a:t>
             </a:r>
           </a:p>
         </p:txBody>
@@ -3728,7 +5694,7 @@
     </p:spTree>
     <p:extLst>
       <p:ext uri="{BB962C8B-B14F-4D97-AF65-F5344CB8AC3E}">
-        <p14:creationId xmlns:p14="http://schemas.microsoft.com/office/powerpoint/2010/main" val="947249045"/>
+        <p14:creationId xmlns:p14="http://schemas.microsoft.com/office/powerpoint/2010/main" val="752026895"/>
       </p:ext>
     </p:extLst>
   </p:cSld>

</xml_diff>